<commit_message>
finita parte cd e cm
</commit_message>
<xml_diff>
--- a/MTSSAssignment3.pptx
+++ b/MTSSAssignment3.pptx
@@ -5,7 +5,7 @@
     <p:sldMasterId id="2147483648" r:id="rId1"/>
   </p:sldMasterIdLst>
   <p:notesMasterIdLst>
-    <p:notesMasterId r:id="rId32"/>
+    <p:notesMasterId r:id="rId36"/>
   </p:notesMasterIdLst>
   <p:sldIdLst>
     <p:sldId id="257" r:id="rId2"/>
@@ -35,9 +35,13 @@
     <p:sldId id="328" r:id="rId26"/>
     <p:sldId id="329" r:id="rId27"/>
     <p:sldId id="307" r:id="rId28"/>
-    <p:sldId id="308" r:id="rId29"/>
-    <p:sldId id="309" r:id="rId30"/>
-    <p:sldId id="284" r:id="rId31"/>
+    <p:sldId id="330" r:id="rId29"/>
+    <p:sldId id="308" r:id="rId30"/>
+    <p:sldId id="331" r:id="rId31"/>
+    <p:sldId id="332" r:id="rId32"/>
+    <p:sldId id="309" r:id="rId33"/>
+    <p:sldId id="333" r:id="rId34"/>
+    <p:sldId id="284" r:id="rId35"/>
   </p:sldIdLst>
   <p:sldSz cx="12192000" cy="6858000"/>
   <p:notesSz cx="6858000" cy="9144000"/>
@@ -226,7 +230,7 @@
           <a:p>
             <a:fld id="{EFB7D28E-7638-40DD-9951-FAEDC6EFEA2A}" type="datetimeFigureOut">
               <a:rPr lang="it-IT" smtClean="0"/>
-              <a:t>08/06/2022</a:t>
+              <a:t>09/06/2022</a:t>
             </a:fld>
             <a:endParaRPr lang="it-IT"/>
           </a:p>
@@ -1669,6 +1673,342 @@
 </p:notes>
 </file>
 
+<file path=ppt/notesSlides/notesSlide22.xml><?xml version="1.0" encoding="utf-8"?>
+<p:notes xmlns:a="http://schemas.openxmlformats.org/drawingml/2006/main" xmlns:r="http://schemas.openxmlformats.org/officeDocument/2006/relationships" xmlns:p="http://schemas.openxmlformats.org/presentationml/2006/main">
+  <p:cSld>
+    <p:spTree>
+      <p:nvGrpSpPr>
+        <p:cNvPr id="1" name=""/>
+        <p:cNvGrpSpPr/>
+        <p:nvPr/>
+      </p:nvGrpSpPr>
+      <p:grpSpPr>
+        <a:xfrm>
+          <a:off x="0" y="0"/>
+          <a:ext cx="0" cy="0"/>
+          <a:chOff x="0" y="0"/>
+          <a:chExt cx="0" cy="0"/>
+        </a:xfrm>
+      </p:grpSpPr>
+      <p:sp>
+        <p:nvSpPr>
+          <p:cNvPr id="2" name="Segnaposto immagine diapositiva 1"/>
+          <p:cNvSpPr>
+            <a:spLocks noGrp="1" noRot="1" noChangeAspect="1"/>
+          </p:cNvSpPr>
+          <p:nvPr>
+            <p:ph type="sldImg"/>
+          </p:nvPr>
+        </p:nvSpPr>
+        <p:spPr/>
+      </p:sp>
+      <p:sp>
+        <p:nvSpPr>
+          <p:cNvPr id="3" name="Segnaposto note 2"/>
+          <p:cNvSpPr>
+            <a:spLocks noGrp="1"/>
+          </p:cNvSpPr>
+          <p:nvPr>
+            <p:ph type="body" idx="1"/>
+          </p:nvPr>
+        </p:nvSpPr>
+        <p:spPr/>
+        <p:txBody>
+          <a:bodyPr/>
+          <a:lstStyle/>
+          <a:p>
+            <a:endParaRPr lang="it-IT"/>
+          </a:p>
+        </p:txBody>
+      </p:sp>
+      <p:sp>
+        <p:nvSpPr>
+          <p:cNvPr id="4" name="Segnaposto numero diapositiva 3"/>
+          <p:cNvSpPr>
+            <a:spLocks noGrp="1"/>
+          </p:cNvSpPr>
+          <p:nvPr>
+            <p:ph type="sldNum" sz="quarter" idx="5"/>
+          </p:nvPr>
+        </p:nvSpPr>
+        <p:spPr/>
+        <p:txBody>
+          <a:bodyPr/>
+          <a:lstStyle/>
+          <a:p>
+            <a:fld id="{0BC78E95-8A02-4863-86BC-3BDFF2A12A63}" type="slidenum">
+              <a:rPr lang="it-IT" smtClean="0"/>
+              <a:t>28</a:t>
+            </a:fld>
+            <a:endParaRPr lang="it-IT"/>
+          </a:p>
+        </p:txBody>
+      </p:sp>
+    </p:spTree>
+    <p:extLst>
+      <p:ext uri="{BB962C8B-B14F-4D97-AF65-F5344CB8AC3E}">
+        <p14:creationId xmlns:p14="http://schemas.microsoft.com/office/powerpoint/2010/main" val="866664213"/>
+      </p:ext>
+    </p:extLst>
+  </p:cSld>
+  <p:clrMapOvr>
+    <a:masterClrMapping/>
+  </p:clrMapOvr>
+</p:notes>
+</file>
+
+<file path=ppt/notesSlides/notesSlide23.xml><?xml version="1.0" encoding="utf-8"?>
+<p:notes xmlns:a="http://schemas.openxmlformats.org/drawingml/2006/main" xmlns:r="http://schemas.openxmlformats.org/officeDocument/2006/relationships" xmlns:p="http://schemas.openxmlformats.org/presentationml/2006/main">
+  <p:cSld>
+    <p:spTree>
+      <p:nvGrpSpPr>
+        <p:cNvPr id="1" name=""/>
+        <p:cNvGrpSpPr/>
+        <p:nvPr/>
+      </p:nvGrpSpPr>
+      <p:grpSpPr>
+        <a:xfrm>
+          <a:off x="0" y="0"/>
+          <a:ext cx="0" cy="0"/>
+          <a:chOff x="0" y="0"/>
+          <a:chExt cx="0" cy="0"/>
+        </a:xfrm>
+      </p:grpSpPr>
+      <p:sp>
+        <p:nvSpPr>
+          <p:cNvPr id="2" name="Segnaposto immagine diapositiva 1"/>
+          <p:cNvSpPr>
+            <a:spLocks noGrp="1" noRot="1" noChangeAspect="1"/>
+          </p:cNvSpPr>
+          <p:nvPr>
+            <p:ph type="sldImg"/>
+          </p:nvPr>
+        </p:nvSpPr>
+        <p:spPr/>
+      </p:sp>
+      <p:sp>
+        <p:nvSpPr>
+          <p:cNvPr id="3" name="Segnaposto note 2"/>
+          <p:cNvSpPr>
+            <a:spLocks noGrp="1"/>
+          </p:cNvSpPr>
+          <p:nvPr>
+            <p:ph type="body" idx="1"/>
+          </p:nvPr>
+        </p:nvSpPr>
+        <p:spPr/>
+        <p:txBody>
+          <a:bodyPr/>
+          <a:lstStyle/>
+          <a:p>
+            <a:endParaRPr lang="it-IT"/>
+          </a:p>
+        </p:txBody>
+      </p:sp>
+      <p:sp>
+        <p:nvSpPr>
+          <p:cNvPr id="4" name="Segnaposto numero diapositiva 3"/>
+          <p:cNvSpPr>
+            <a:spLocks noGrp="1"/>
+          </p:cNvSpPr>
+          <p:nvPr>
+            <p:ph type="sldNum" sz="quarter" idx="5"/>
+          </p:nvPr>
+        </p:nvSpPr>
+        <p:spPr/>
+        <p:txBody>
+          <a:bodyPr/>
+          <a:lstStyle/>
+          <a:p>
+            <a:fld id="{0BC78E95-8A02-4863-86BC-3BDFF2A12A63}" type="slidenum">
+              <a:rPr lang="it-IT" smtClean="0"/>
+              <a:t>30</a:t>
+            </a:fld>
+            <a:endParaRPr lang="it-IT"/>
+          </a:p>
+        </p:txBody>
+      </p:sp>
+    </p:spTree>
+    <p:extLst>
+      <p:ext uri="{BB962C8B-B14F-4D97-AF65-F5344CB8AC3E}">
+        <p14:creationId xmlns:p14="http://schemas.microsoft.com/office/powerpoint/2010/main" val="910933284"/>
+      </p:ext>
+    </p:extLst>
+  </p:cSld>
+  <p:clrMapOvr>
+    <a:masterClrMapping/>
+  </p:clrMapOvr>
+</p:notes>
+</file>
+
+<file path=ppt/notesSlides/notesSlide24.xml><?xml version="1.0" encoding="utf-8"?>
+<p:notes xmlns:a="http://schemas.openxmlformats.org/drawingml/2006/main" xmlns:r="http://schemas.openxmlformats.org/officeDocument/2006/relationships" xmlns:p="http://schemas.openxmlformats.org/presentationml/2006/main">
+  <p:cSld>
+    <p:spTree>
+      <p:nvGrpSpPr>
+        <p:cNvPr id="1" name=""/>
+        <p:cNvGrpSpPr/>
+        <p:nvPr/>
+      </p:nvGrpSpPr>
+      <p:grpSpPr>
+        <a:xfrm>
+          <a:off x="0" y="0"/>
+          <a:ext cx="0" cy="0"/>
+          <a:chOff x="0" y="0"/>
+          <a:chExt cx="0" cy="0"/>
+        </a:xfrm>
+      </p:grpSpPr>
+      <p:sp>
+        <p:nvSpPr>
+          <p:cNvPr id="2" name="Segnaposto immagine diapositiva 1"/>
+          <p:cNvSpPr>
+            <a:spLocks noGrp="1" noRot="1" noChangeAspect="1"/>
+          </p:cNvSpPr>
+          <p:nvPr>
+            <p:ph type="sldImg"/>
+          </p:nvPr>
+        </p:nvSpPr>
+        <p:spPr/>
+      </p:sp>
+      <p:sp>
+        <p:nvSpPr>
+          <p:cNvPr id="3" name="Segnaposto note 2"/>
+          <p:cNvSpPr>
+            <a:spLocks noGrp="1"/>
+          </p:cNvSpPr>
+          <p:nvPr>
+            <p:ph type="body" idx="1"/>
+          </p:nvPr>
+        </p:nvSpPr>
+        <p:spPr/>
+        <p:txBody>
+          <a:bodyPr/>
+          <a:lstStyle/>
+          <a:p>
+            <a:endParaRPr lang="it-IT"/>
+          </a:p>
+        </p:txBody>
+      </p:sp>
+      <p:sp>
+        <p:nvSpPr>
+          <p:cNvPr id="4" name="Segnaposto numero diapositiva 3"/>
+          <p:cNvSpPr>
+            <a:spLocks noGrp="1"/>
+          </p:cNvSpPr>
+          <p:nvPr>
+            <p:ph type="sldNum" sz="quarter" idx="5"/>
+          </p:nvPr>
+        </p:nvSpPr>
+        <p:spPr/>
+        <p:txBody>
+          <a:bodyPr/>
+          <a:lstStyle/>
+          <a:p>
+            <a:fld id="{0BC78E95-8A02-4863-86BC-3BDFF2A12A63}" type="slidenum">
+              <a:rPr lang="it-IT" smtClean="0"/>
+              <a:t>31</a:t>
+            </a:fld>
+            <a:endParaRPr lang="it-IT"/>
+          </a:p>
+        </p:txBody>
+      </p:sp>
+    </p:spTree>
+    <p:extLst>
+      <p:ext uri="{BB962C8B-B14F-4D97-AF65-F5344CB8AC3E}">
+        <p14:creationId xmlns:p14="http://schemas.microsoft.com/office/powerpoint/2010/main" val="3174189577"/>
+      </p:ext>
+    </p:extLst>
+  </p:cSld>
+  <p:clrMapOvr>
+    <a:masterClrMapping/>
+  </p:clrMapOvr>
+</p:notes>
+</file>
+
+<file path=ppt/notesSlides/notesSlide25.xml><?xml version="1.0" encoding="utf-8"?>
+<p:notes xmlns:a="http://schemas.openxmlformats.org/drawingml/2006/main" xmlns:r="http://schemas.openxmlformats.org/officeDocument/2006/relationships" xmlns:p="http://schemas.openxmlformats.org/presentationml/2006/main">
+  <p:cSld>
+    <p:spTree>
+      <p:nvGrpSpPr>
+        <p:cNvPr id="1" name=""/>
+        <p:cNvGrpSpPr/>
+        <p:nvPr/>
+      </p:nvGrpSpPr>
+      <p:grpSpPr>
+        <a:xfrm>
+          <a:off x="0" y="0"/>
+          <a:ext cx="0" cy="0"/>
+          <a:chOff x="0" y="0"/>
+          <a:chExt cx="0" cy="0"/>
+        </a:xfrm>
+      </p:grpSpPr>
+      <p:sp>
+        <p:nvSpPr>
+          <p:cNvPr id="2" name="Segnaposto immagine diapositiva 1"/>
+          <p:cNvSpPr>
+            <a:spLocks noGrp="1" noRot="1" noChangeAspect="1"/>
+          </p:cNvSpPr>
+          <p:nvPr>
+            <p:ph type="sldImg"/>
+          </p:nvPr>
+        </p:nvSpPr>
+        <p:spPr/>
+      </p:sp>
+      <p:sp>
+        <p:nvSpPr>
+          <p:cNvPr id="3" name="Segnaposto note 2"/>
+          <p:cNvSpPr>
+            <a:spLocks noGrp="1"/>
+          </p:cNvSpPr>
+          <p:nvPr>
+            <p:ph type="body" idx="1"/>
+          </p:nvPr>
+        </p:nvSpPr>
+        <p:spPr/>
+        <p:txBody>
+          <a:bodyPr/>
+          <a:lstStyle/>
+          <a:p>
+            <a:endParaRPr lang="it-IT" dirty="0"/>
+          </a:p>
+        </p:txBody>
+      </p:sp>
+      <p:sp>
+        <p:nvSpPr>
+          <p:cNvPr id="4" name="Segnaposto numero diapositiva 3"/>
+          <p:cNvSpPr>
+            <a:spLocks noGrp="1"/>
+          </p:cNvSpPr>
+          <p:nvPr>
+            <p:ph type="sldNum" sz="quarter" idx="5"/>
+          </p:nvPr>
+        </p:nvSpPr>
+        <p:spPr/>
+        <p:txBody>
+          <a:bodyPr/>
+          <a:lstStyle/>
+          <a:p>
+            <a:fld id="{0BC78E95-8A02-4863-86BC-3BDFF2A12A63}" type="slidenum">
+              <a:rPr lang="it-IT" smtClean="0"/>
+              <a:t>33</a:t>
+            </a:fld>
+            <a:endParaRPr lang="it-IT"/>
+          </a:p>
+        </p:txBody>
+      </p:sp>
+    </p:spTree>
+    <p:extLst>
+      <p:ext uri="{BB962C8B-B14F-4D97-AF65-F5344CB8AC3E}">
+        <p14:creationId xmlns:p14="http://schemas.microsoft.com/office/powerpoint/2010/main" val="4162455105"/>
+      </p:ext>
+    </p:extLst>
+  </p:cSld>
+  <p:clrMapOvr>
+    <a:masterClrMapping/>
+  </p:clrMapOvr>
+</p:notes>
+</file>
+
 <file path=ppt/notesSlides/notesSlide3.xml><?xml version="1.0" encoding="utf-8"?>
 <p:notes xmlns:a="http://schemas.openxmlformats.org/drawingml/2006/main" xmlns:r="http://schemas.openxmlformats.org/officeDocument/2006/relationships" xmlns:p="http://schemas.openxmlformats.org/presentationml/2006/main">
   <p:cSld>
@@ -2404,7 +2744,7 @@
           <a:p>
             <a:fld id="{F5AF2708-59DE-4D08-9295-20056C9D5A6B}" type="datetimeFigureOut">
               <a:rPr lang="it-IT" smtClean="0"/>
-              <a:t>08/06/2022</a:t>
+              <a:t>09/06/2022</a:t>
             </a:fld>
             <a:endParaRPr lang="it-IT"/>
           </a:p>
@@ -2602,7 +2942,7 @@
           <a:p>
             <a:fld id="{F5AF2708-59DE-4D08-9295-20056C9D5A6B}" type="datetimeFigureOut">
               <a:rPr lang="it-IT" smtClean="0"/>
-              <a:t>08/06/2022</a:t>
+              <a:t>09/06/2022</a:t>
             </a:fld>
             <a:endParaRPr lang="it-IT"/>
           </a:p>
@@ -2810,7 +3150,7 @@
           <a:p>
             <a:fld id="{F5AF2708-59DE-4D08-9295-20056C9D5A6B}" type="datetimeFigureOut">
               <a:rPr lang="it-IT" smtClean="0"/>
-              <a:t>08/06/2022</a:t>
+              <a:t>09/06/2022</a:t>
             </a:fld>
             <a:endParaRPr lang="it-IT"/>
           </a:p>
@@ -3008,7 +3348,7 @@
           <a:p>
             <a:fld id="{F5AF2708-59DE-4D08-9295-20056C9D5A6B}" type="datetimeFigureOut">
               <a:rPr lang="it-IT" smtClean="0"/>
-              <a:t>08/06/2022</a:t>
+              <a:t>09/06/2022</a:t>
             </a:fld>
             <a:endParaRPr lang="it-IT"/>
           </a:p>
@@ -3283,7 +3623,7 @@
           <a:p>
             <a:fld id="{F5AF2708-59DE-4D08-9295-20056C9D5A6B}" type="datetimeFigureOut">
               <a:rPr lang="it-IT" smtClean="0"/>
-              <a:t>08/06/2022</a:t>
+              <a:t>09/06/2022</a:t>
             </a:fld>
             <a:endParaRPr lang="it-IT"/>
           </a:p>
@@ -3548,7 +3888,7 @@
           <a:p>
             <a:fld id="{F5AF2708-59DE-4D08-9295-20056C9D5A6B}" type="datetimeFigureOut">
               <a:rPr lang="it-IT" smtClean="0"/>
-              <a:t>08/06/2022</a:t>
+              <a:t>09/06/2022</a:t>
             </a:fld>
             <a:endParaRPr lang="it-IT"/>
           </a:p>
@@ -3960,7 +4300,7 @@
           <a:p>
             <a:fld id="{F5AF2708-59DE-4D08-9295-20056C9D5A6B}" type="datetimeFigureOut">
               <a:rPr lang="it-IT" smtClean="0"/>
-              <a:t>08/06/2022</a:t>
+              <a:t>09/06/2022</a:t>
             </a:fld>
             <a:endParaRPr lang="it-IT"/>
           </a:p>
@@ -4101,7 +4441,7 @@
           <a:p>
             <a:fld id="{F5AF2708-59DE-4D08-9295-20056C9D5A6B}" type="datetimeFigureOut">
               <a:rPr lang="it-IT" smtClean="0"/>
-              <a:t>08/06/2022</a:t>
+              <a:t>09/06/2022</a:t>
             </a:fld>
             <a:endParaRPr lang="it-IT"/>
           </a:p>
@@ -4214,7 +4554,7 @@
           <a:p>
             <a:fld id="{F5AF2708-59DE-4D08-9295-20056C9D5A6B}" type="datetimeFigureOut">
               <a:rPr lang="it-IT" smtClean="0"/>
-              <a:t>08/06/2022</a:t>
+              <a:t>09/06/2022</a:t>
             </a:fld>
             <a:endParaRPr lang="it-IT"/>
           </a:p>
@@ -4525,7 +4865,7 @@
           <a:p>
             <a:fld id="{F5AF2708-59DE-4D08-9295-20056C9D5A6B}" type="datetimeFigureOut">
               <a:rPr lang="it-IT" smtClean="0"/>
-              <a:t>08/06/2022</a:t>
+              <a:t>09/06/2022</a:t>
             </a:fld>
             <a:endParaRPr lang="it-IT"/>
           </a:p>
@@ -4813,7 +5153,7 @@
           <a:p>
             <a:fld id="{F5AF2708-59DE-4D08-9295-20056C9D5A6B}" type="datetimeFigureOut">
               <a:rPr lang="it-IT" smtClean="0"/>
-              <a:t>08/06/2022</a:t>
+              <a:t>09/06/2022</a:t>
             </a:fld>
             <a:endParaRPr lang="it-IT"/>
           </a:p>
@@ -5054,7 +5394,7 @@
           <a:p>
             <a:fld id="{F5AF2708-59DE-4D08-9295-20056C9D5A6B}" type="datetimeFigureOut">
               <a:rPr lang="it-IT" smtClean="0"/>
-              <a:t>08/06/2022</a:t>
+              <a:t>09/06/2022</a:t>
             </a:fld>
             <a:endParaRPr lang="it-IT"/>
           </a:p>
@@ -17257,6 +17597,62 @@
           </a:prstGeom>
         </p:spPr>
       </p:pic>
+      <p:pic>
+        <p:nvPicPr>
+          <p:cNvPr id="4" name="Immagine 3">
+            <a:extLst>
+              <a:ext uri="{FF2B5EF4-FFF2-40B4-BE49-F238E27FC236}">
+                <a16:creationId xmlns:a16="http://schemas.microsoft.com/office/drawing/2014/main" id="{66D7719A-6317-E6AA-4B86-C1F85702792F}"/>
+              </a:ext>
+            </a:extLst>
+          </p:cNvPr>
+          <p:cNvPicPr>
+            <a:picLocks noChangeAspect="1"/>
+          </p:cNvPicPr>
+          <p:nvPr/>
+        </p:nvPicPr>
+        <p:blipFill>
+          <a:blip r:embed="rId5">
+            <a:extLst>
+              <a:ext uri="{BEBA8EAE-BF5A-486C-A8C5-ECC9F3942E4B}">
+                <a14:imgProps xmlns:a14="http://schemas.microsoft.com/office/drawing/2010/main">
+                  <a14:imgLayer r:embed="rId6">
+                    <a14:imgEffect>
+                      <a14:backgroundRemoval t="2703" b="83784" l="5344" r="93130">
+                        <a14:foregroundMark x1="8397" y1="35135" x2="25954" y2="75676"/>
+                        <a14:foregroundMark x1="32824" y1="78378" x2="5344" y2="70270"/>
+                        <a14:foregroundMark x1="5344" y1="70270" x2="9160" y2="32432"/>
+                        <a14:foregroundMark x1="9160" y1="29730" x2="50382" y2="32432"/>
+                        <a14:foregroundMark x1="50382" y1="32432" x2="78626" y2="27027"/>
+                        <a14:foregroundMark x1="78626" y1="27027" x2="79389" y2="29730"/>
+                        <a14:foregroundMark x1="29008" y1="67568" x2="58015" y2="64865"/>
+                        <a14:foregroundMark x1="58015" y1="64865" x2="83969" y2="67568"/>
+                        <a14:foregroundMark x1="83969" y1="67568" x2="91603" y2="24324"/>
+                        <a14:foregroundMark x1="83969" y1="72973" x2="93130" y2="24324"/>
+                      </a14:backgroundRemoval>
+                    </a14:imgEffect>
+                  </a14:imgLayer>
+                </a14:imgProps>
+              </a:ext>
+              <a:ext uri="{28A0092B-C50C-407E-A947-70E740481C1C}">
+                <a14:useLocalDpi xmlns:a14="http://schemas.microsoft.com/office/drawing/2010/main" val="0"/>
+              </a:ext>
+            </a:extLst>
+          </a:blip>
+          <a:stretch>
+            <a:fillRect/>
+          </a:stretch>
+        </p:blipFill>
+        <p:spPr>
+          <a:xfrm>
+            <a:off x="9860494" y="5017432"/>
+            <a:ext cx="1829829" cy="516821"/>
+          </a:xfrm>
+          <a:prstGeom prst="rect">
+            <a:avLst/>
+          </a:prstGeom>
+        </p:spPr>
+      </p:pic>
     </p:spTree>
     <p:extLst>
       <p:ext uri="{BB962C8B-B14F-4D97-AF65-F5344CB8AC3E}">
@@ -17600,6 +17996,695 @@
       </p:grpSpPr>
       <p:sp>
         <p:nvSpPr>
+          <p:cNvPr id="25" name="Segnaposto data 24">
+            <a:extLst>
+              <a:ext uri="{FF2B5EF4-FFF2-40B4-BE49-F238E27FC236}">
+                <a16:creationId xmlns:a16="http://schemas.microsoft.com/office/drawing/2014/main" id="{115DF917-AC48-486A-81F6-CF2DBBF5CD89}"/>
+              </a:ext>
+            </a:extLst>
+          </p:cNvPr>
+          <p:cNvSpPr>
+            <a:spLocks noGrp="1"/>
+          </p:cNvSpPr>
+          <p:nvPr>
+            <p:ph type="dt" sz="half" idx="10"/>
+          </p:nvPr>
+        </p:nvSpPr>
+        <p:spPr/>
+        <p:txBody>
+          <a:bodyPr/>
+          <a:lstStyle/>
+          <a:p>
+            <a:r>
+              <a:rPr lang="it-IT" sz="1600">
+                <a:solidFill>
+                  <a:schemeClr val="tx1"/>
+                </a:solidFill>
+                <a:latin typeface="Poppins Medium" panose="00000600000000000000" pitchFamily="2" charset="0"/>
+                <a:cs typeface="Poppins Medium" panose="00000600000000000000" pitchFamily="2" charset="0"/>
+              </a:rPr>
+              <a:t>31 Maggio 2022</a:t>
+            </a:r>
+            <a:endParaRPr lang="de-DE" sz="1600">
+              <a:solidFill>
+                <a:schemeClr val="tx1"/>
+              </a:solidFill>
+              <a:latin typeface="Poppins Medium" panose="00000600000000000000" pitchFamily="2" charset="0"/>
+              <a:cs typeface="Poppins Medium" panose="00000600000000000000" pitchFamily="2" charset="0"/>
+            </a:endParaRPr>
+          </a:p>
+        </p:txBody>
+      </p:sp>
+      <p:sp>
+        <p:nvSpPr>
+          <p:cNvPr id="27" name="Segnaposto numero diapositiva 26">
+            <a:extLst>
+              <a:ext uri="{FF2B5EF4-FFF2-40B4-BE49-F238E27FC236}">
+                <a16:creationId xmlns:a16="http://schemas.microsoft.com/office/drawing/2014/main" id="{F9C2EE25-215B-477C-AC6E-D2639B7A24B6}"/>
+              </a:ext>
+            </a:extLst>
+          </p:cNvPr>
+          <p:cNvSpPr>
+            <a:spLocks noGrp="1"/>
+          </p:cNvSpPr>
+          <p:nvPr>
+            <p:ph type="sldNum" sz="quarter" idx="12"/>
+          </p:nvPr>
+        </p:nvSpPr>
+        <p:spPr/>
+        <p:txBody>
+          <a:bodyPr/>
+          <a:lstStyle/>
+          <a:p>
+            <a:fld id="{66CD45B7-DFE2-4393-8D37-380FC36BF3AA}" type="slidenum">
+              <a:rPr lang="de-DE" sz="1600" smtClean="0">
+                <a:solidFill>
+                  <a:schemeClr val="tx1"/>
+                </a:solidFill>
+                <a:latin typeface="Poppins Medium" panose="00000600000000000000" pitchFamily="2" charset="0"/>
+                <a:cs typeface="Poppins Medium" panose="00000600000000000000" pitchFamily="2" charset="0"/>
+              </a:rPr>
+              <a:t>28</a:t>
+            </a:fld>
+            <a:r>
+              <a:rPr lang="de-DE" sz="1600">
+                <a:solidFill>
+                  <a:schemeClr val="tx1"/>
+                </a:solidFill>
+                <a:latin typeface="Poppins Medium" panose="00000600000000000000" pitchFamily="2" charset="0"/>
+                <a:cs typeface="Poppins Medium" panose="00000600000000000000" pitchFamily="2" charset="0"/>
+              </a:rPr>
+              <a:t>/16</a:t>
+            </a:r>
+          </a:p>
+        </p:txBody>
+      </p:sp>
+      <p:sp>
+        <p:nvSpPr>
+          <p:cNvPr id="12" name="Rettangolo 11">
+            <a:extLst>
+              <a:ext uri="{FF2B5EF4-FFF2-40B4-BE49-F238E27FC236}">
+                <a16:creationId xmlns:a16="http://schemas.microsoft.com/office/drawing/2014/main" id="{F0FAD030-2623-A89C-4FA1-55CE81C0AE08}"/>
+              </a:ext>
+            </a:extLst>
+          </p:cNvPr>
+          <p:cNvSpPr/>
+          <p:nvPr/>
+        </p:nvSpPr>
+        <p:spPr>
+          <a:xfrm>
+            <a:off x="0" y="0"/>
+            <a:ext cx="12184913" cy="1034891"/>
+          </a:xfrm>
+          <a:prstGeom prst="rect">
+            <a:avLst/>
+          </a:prstGeom>
+          <a:solidFill>
+            <a:srgbClr val="002060"/>
+          </a:solidFill>
+          <a:ln>
+            <a:noFill/>
+          </a:ln>
+        </p:spPr>
+        <p:style>
+          <a:lnRef idx="2">
+            <a:schemeClr val="accent3">
+              <a:shade val="50000"/>
+            </a:schemeClr>
+          </a:lnRef>
+          <a:fillRef idx="1">
+            <a:schemeClr val="accent3"/>
+          </a:fillRef>
+          <a:effectRef idx="0">
+            <a:schemeClr val="accent3"/>
+          </a:effectRef>
+          <a:fontRef idx="minor">
+            <a:schemeClr val="lt1"/>
+          </a:fontRef>
+        </p:style>
+        <p:txBody>
+          <a:bodyPr rtlCol="0" anchor="ctr"/>
+          <a:lstStyle/>
+          <a:p>
+            <a:pPr algn="ctr"/>
+            <a:endParaRPr lang="it-IT"/>
+          </a:p>
+        </p:txBody>
+      </p:sp>
+      <p:sp>
+        <p:nvSpPr>
+          <p:cNvPr id="13" name="Titolo 1">
+            <a:extLst>
+              <a:ext uri="{FF2B5EF4-FFF2-40B4-BE49-F238E27FC236}">
+                <a16:creationId xmlns:a16="http://schemas.microsoft.com/office/drawing/2014/main" id="{A0F14F07-00BE-A130-44A5-463A5F98673C}"/>
+              </a:ext>
+            </a:extLst>
+          </p:cNvPr>
+          <p:cNvSpPr>
+            <a:spLocks noGrp="1"/>
+          </p:cNvSpPr>
+          <p:nvPr>
+            <p:ph type="title"/>
+          </p:nvPr>
+        </p:nvSpPr>
+        <p:spPr>
+          <a:xfrm>
+            <a:off x="272535" y="163591"/>
+            <a:ext cx="10176803" cy="707708"/>
+          </a:xfrm>
+        </p:spPr>
+        <p:txBody>
+          <a:bodyPr anchor="b">
+            <a:normAutofit/>
+          </a:bodyPr>
+          <a:lstStyle/>
+          <a:p>
+            <a:r>
+              <a:rPr lang="it-IT" sz="4000" b="1" dirty="0">
+                <a:solidFill>
+                  <a:schemeClr val="bg1"/>
+                </a:solidFill>
+                <a:latin typeface="Poppins"/>
+                <a:cs typeface="Poppins"/>
+              </a:rPr>
+              <a:t>AR-Strumento utilizzato</a:t>
+            </a:r>
+          </a:p>
+        </p:txBody>
+      </p:sp>
+      <p:sp>
+        <p:nvSpPr>
+          <p:cNvPr id="8" name="Segnaposto contenuto 6">
+            <a:extLst>
+              <a:ext uri="{FF2B5EF4-FFF2-40B4-BE49-F238E27FC236}">
+                <a16:creationId xmlns:a16="http://schemas.microsoft.com/office/drawing/2014/main" id="{F832EED3-9182-E3BD-D2D5-1723AFD8A0BD}"/>
+              </a:ext>
+            </a:extLst>
+          </p:cNvPr>
+          <p:cNvSpPr txBox="1">
+            <a:spLocks/>
+          </p:cNvSpPr>
+          <p:nvPr/>
+        </p:nvSpPr>
+        <p:spPr>
+          <a:xfrm>
+            <a:off x="834656" y="2005012"/>
+            <a:ext cx="10515600" cy="4351338"/>
+          </a:xfrm>
+          <a:prstGeom prst="rect">
+            <a:avLst/>
+          </a:prstGeom>
+        </p:spPr>
+        <p:txBody>
+          <a:bodyPr vert="horz" lIns="91440" tIns="45720" rIns="91440" bIns="45720" rtlCol="0">
+            <a:normAutofit/>
+          </a:bodyPr>
+          <a:lstStyle>
+            <a:lvl1pPr marL="228600" indent="-228600" algn="l" defTabSz="914400" rtl="0" eaLnBrk="1" latinLnBrk="0" hangingPunct="1">
+              <a:lnSpc>
+                <a:spcPct val="90000"/>
+              </a:lnSpc>
+              <a:spcBef>
+                <a:spcPts val="1000"/>
+              </a:spcBef>
+              <a:buFont typeface="Arial" panose="020B0604020202020204" pitchFamily="34" charset="0"/>
+              <a:buChar char="•"/>
+              <a:defRPr sz="2800" kern="1200">
+                <a:solidFill>
+                  <a:schemeClr val="tx1"/>
+                </a:solidFill>
+                <a:latin typeface="+mn-lt"/>
+                <a:ea typeface="+mn-ea"/>
+                <a:cs typeface="+mn-cs"/>
+              </a:defRPr>
+            </a:lvl1pPr>
+            <a:lvl2pPr marL="685800" indent="-228600" algn="l" defTabSz="914400" rtl="0" eaLnBrk="1" latinLnBrk="0" hangingPunct="1">
+              <a:lnSpc>
+                <a:spcPct val="90000"/>
+              </a:lnSpc>
+              <a:spcBef>
+                <a:spcPts val="500"/>
+              </a:spcBef>
+              <a:buFont typeface="Arial" panose="020B0604020202020204" pitchFamily="34" charset="0"/>
+              <a:buChar char="•"/>
+              <a:defRPr sz="2400" kern="1200">
+                <a:solidFill>
+                  <a:schemeClr val="tx1"/>
+                </a:solidFill>
+                <a:latin typeface="+mn-lt"/>
+                <a:ea typeface="+mn-ea"/>
+                <a:cs typeface="+mn-cs"/>
+              </a:defRPr>
+            </a:lvl2pPr>
+            <a:lvl3pPr marL="1143000" indent="-228600" algn="l" defTabSz="914400" rtl="0" eaLnBrk="1" latinLnBrk="0" hangingPunct="1">
+              <a:lnSpc>
+                <a:spcPct val="90000"/>
+              </a:lnSpc>
+              <a:spcBef>
+                <a:spcPts val="500"/>
+              </a:spcBef>
+              <a:buFont typeface="Arial" panose="020B0604020202020204" pitchFamily="34" charset="0"/>
+              <a:buChar char="•"/>
+              <a:defRPr sz="2000" kern="1200">
+                <a:solidFill>
+                  <a:schemeClr val="tx1"/>
+                </a:solidFill>
+                <a:latin typeface="+mn-lt"/>
+                <a:ea typeface="+mn-ea"/>
+                <a:cs typeface="+mn-cs"/>
+              </a:defRPr>
+            </a:lvl3pPr>
+            <a:lvl4pPr marL="1600200" indent="-228600" algn="l" defTabSz="914400" rtl="0" eaLnBrk="1" latinLnBrk="0" hangingPunct="1">
+              <a:lnSpc>
+                <a:spcPct val="90000"/>
+              </a:lnSpc>
+              <a:spcBef>
+                <a:spcPts val="500"/>
+              </a:spcBef>
+              <a:buFont typeface="Arial" panose="020B0604020202020204" pitchFamily="34" charset="0"/>
+              <a:buChar char="•"/>
+              <a:defRPr sz="1800" kern="1200">
+                <a:solidFill>
+                  <a:schemeClr val="tx1"/>
+                </a:solidFill>
+                <a:latin typeface="+mn-lt"/>
+                <a:ea typeface="+mn-ea"/>
+                <a:cs typeface="+mn-cs"/>
+              </a:defRPr>
+            </a:lvl4pPr>
+            <a:lvl5pPr marL="2057400" indent="-228600" algn="l" defTabSz="914400" rtl="0" eaLnBrk="1" latinLnBrk="0" hangingPunct="1">
+              <a:lnSpc>
+                <a:spcPct val="90000"/>
+              </a:lnSpc>
+              <a:spcBef>
+                <a:spcPts val="500"/>
+              </a:spcBef>
+              <a:buFont typeface="Arial" panose="020B0604020202020204" pitchFamily="34" charset="0"/>
+              <a:buChar char="•"/>
+              <a:defRPr sz="1800" kern="1200">
+                <a:solidFill>
+                  <a:schemeClr val="tx1"/>
+                </a:solidFill>
+                <a:latin typeface="+mn-lt"/>
+                <a:ea typeface="+mn-ea"/>
+                <a:cs typeface="+mn-cs"/>
+              </a:defRPr>
+            </a:lvl5pPr>
+            <a:lvl6pPr marL="2514600" indent="-228600" algn="l" defTabSz="914400" rtl="0" eaLnBrk="1" latinLnBrk="0" hangingPunct="1">
+              <a:lnSpc>
+                <a:spcPct val="90000"/>
+              </a:lnSpc>
+              <a:spcBef>
+                <a:spcPts val="500"/>
+              </a:spcBef>
+              <a:buFont typeface="Arial" panose="020B0604020202020204" pitchFamily="34" charset="0"/>
+              <a:buChar char="•"/>
+              <a:defRPr sz="1800" kern="1200">
+                <a:solidFill>
+                  <a:schemeClr val="tx1"/>
+                </a:solidFill>
+                <a:latin typeface="+mn-lt"/>
+                <a:ea typeface="+mn-ea"/>
+                <a:cs typeface="+mn-cs"/>
+              </a:defRPr>
+            </a:lvl6pPr>
+            <a:lvl7pPr marL="2971800" indent="-228600" algn="l" defTabSz="914400" rtl="0" eaLnBrk="1" latinLnBrk="0" hangingPunct="1">
+              <a:lnSpc>
+                <a:spcPct val="90000"/>
+              </a:lnSpc>
+              <a:spcBef>
+                <a:spcPts val="500"/>
+              </a:spcBef>
+              <a:buFont typeface="Arial" panose="020B0604020202020204" pitchFamily="34" charset="0"/>
+              <a:buChar char="•"/>
+              <a:defRPr sz="1800" kern="1200">
+                <a:solidFill>
+                  <a:schemeClr val="tx1"/>
+                </a:solidFill>
+                <a:latin typeface="+mn-lt"/>
+                <a:ea typeface="+mn-ea"/>
+                <a:cs typeface="+mn-cs"/>
+              </a:defRPr>
+            </a:lvl7pPr>
+            <a:lvl8pPr marL="3429000" indent="-228600" algn="l" defTabSz="914400" rtl="0" eaLnBrk="1" latinLnBrk="0" hangingPunct="1">
+              <a:lnSpc>
+                <a:spcPct val="90000"/>
+              </a:lnSpc>
+              <a:spcBef>
+                <a:spcPts val="500"/>
+              </a:spcBef>
+              <a:buFont typeface="Arial" panose="020B0604020202020204" pitchFamily="34" charset="0"/>
+              <a:buChar char="•"/>
+              <a:defRPr sz="1800" kern="1200">
+                <a:solidFill>
+                  <a:schemeClr val="tx1"/>
+                </a:solidFill>
+                <a:latin typeface="+mn-lt"/>
+                <a:ea typeface="+mn-ea"/>
+                <a:cs typeface="+mn-cs"/>
+              </a:defRPr>
+            </a:lvl8pPr>
+            <a:lvl9pPr marL="3886200" indent="-228600" algn="l" defTabSz="914400" rtl="0" eaLnBrk="1" latinLnBrk="0" hangingPunct="1">
+              <a:lnSpc>
+                <a:spcPct val="90000"/>
+              </a:lnSpc>
+              <a:spcBef>
+                <a:spcPts val="500"/>
+              </a:spcBef>
+              <a:buFont typeface="Arial" panose="020B0604020202020204" pitchFamily="34" charset="0"/>
+              <a:buChar char="•"/>
+              <a:defRPr sz="1800" kern="1200">
+                <a:solidFill>
+                  <a:schemeClr val="tx1"/>
+                </a:solidFill>
+                <a:latin typeface="+mn-lt"/>
+                <a:ea typeface="+mn-ea"/>
+                <a:cs typeface="+mn-cs"/>
+              </a:defRPr>
+            </a:lvl9pPr>
+          </a:lstStyle>
+          <a:p>
+            <a:pPr marL="0" indent="0">
+              <a:buFont typeface="Arial" panose="020B0604020202020204" pitchFamily="34" charset="0"/>
+              <a:buNone/>
+            </a:pPr>
+            <a:endParaRPr lang="it-IT" sz="2400" dirty="0">
+              <a:latin typeface="Poppins Medium" panose="00000600000000000000" pitchFamily="2" charset="0"/>
+              <a:cs typeface="Poppins Medium" panose="00000600000000000000" pitchFamily="2" charset="0"/>
+            </a:endParaRPr>
+          </a:p>
+          <a:p>
+            <a:pPr marL="0" indent="0">
+              <a:buFont typeface="Arial" panose="020B0604020202020204" pitchFamily="34" charset="0"/>
+              <a:buNone/>
+            </a:pPr>
+            <a:endParaRPr lang="it-IT" sz="2400" dirty="0">
+              <a:latin typeface="Poppins Medium" panose="00000600000000000000" pitchFamily="2" charset="0"/>
+              <a:cs typeface="Poppins Medium" panose="00000600000000000000" pitchFamily="2" charset="0"/>
+            </a:endParaRPr>
+          </a:p>
+          <a:p>
+            <a:pPr marL="0" indent="0">
+              <a:buFont typeface="Arial" panose="020B0604020202020204" pitchFamily="34" charset="0"/>
+              <a:buNone/>
+            </a:pPr>
+            <a:endParaRPr lang="it-IT" sz="2400" dirty="0">
+              <a:latin typeface="Poppins Medium" panose="00000600000000000000" pitchFamily="2" charset="0"/>
+              <a:cs typeface="Poppins Medium" panose="00000600000000000000" pitchFamily="2" charset="0"/>
+            </a:endParaRPr>
+          </a:p>
+          <a:p>
+            <a:pPr marL="0" indent="0">
+              <a:buFont typeface="Arial" panose="020B0604020202020204" pitchFamily="34" charset="0"/>
+              <a:buNone/>
+            </a:pPr>
+            <a:endParaRPr lang="it-IT" dirty="0">
+              <a:solidFill>
+                <a:schemeClr val="accent1">
+                  <a:lumMod val="75000"/>
+                </a:schemeClr>
+              </a:solidFill>
+            </a:endParaRPr>
+          </a:p>
+        </p:txBody>
+      </p:sp>
+      <p:sp>
+        <p:nvSpPr>
+          <p:cNvPr id="10" name="CasellaDiTesto 9">
+            <a:extLst>
+              <a:ext uri="{FF2B5EF4-FFF2-40B4-BE49-F238E27FC236}">
+                <a16:creationId xmlns:a16="http://schemas.microsoft.com/office/drawing/2014/main" id="{A7CDDB9E-ADE5-C99D-F37A-B5643C4976DA}"/>
+              </a:ext>
+            </a:extLst>
+          </p:cNvPr>
+          <p:cNvSpPr txBox="1"/>
+          <p:nvPr/>
+        </p:nvSpPr>
+        <p:spPr>
+          <a:xfrm>
+            <a:off x="735083" y="1368877"/>
+            <a:ext cx="4881021" cy="2246769"/>
+          </a:xfrm>
+          <a:prstGeom prst="rect">
+            <a:avLst/>
+          </a:prstGeom>
+          <a:noFill/>
+        </p:spPr>
+        <p:txBody>
+          <a:bodyPr wrap="square" rtlCol="0">
+            <a:spAutoFit/>
+          </a:bodyPr>
+          <a:lstStyle/>
+          <a:p>
+            <a:r>
+              <a:rPr lang="it-IT" sz="2800" dirty="0">
+                <a:latin typeface="Poppins Medium" panose="00000600000000000000" pitchFamily="2" charset="0"/>
+                <a:cs typeface="Poppins Medium" panose="00000600000000000000" pitchFamily="2" charset="0"/>
+              </a:rPr>
+              <a:t>Il progetto utilizza il gestore di pacchetti e dipendenze </a:t>
+            </a:r>
+            <a:r>
+              <a:rPr lang="it-IT" sz="2800" dirty="0" err="1">
+                <a:latin typeface="Poppins Medium" panose="00000600000000000000" pitchFamily="2" charset="0"/>
+                <a:cs typeface="Poppins Medium" panose="00000600000000000000" pitchFamily="2" charset="0"/>
+              </a:rPr>
+              <a:t>npm</a:t>
+            </a:r>
+            <a:r>
+              <a:rPr lang="it-IT" sz="2800" dirty="0">
+                <a:latin typeface="Poppins Medium" panose="00000600000000000000" pitchFamily="2" charset="0"/>
+                <a:cs typeface="Poppins Medium" panose="00000600000000000000" pitchFamily="2" charset="0"/>
+              </a:rPr>
+              <a:t>.</a:t>
+            </a:r>
+          </a:p>
+          <a:p>
+            <a:r>
+              <a:rPr lang="it-IT" sz="2800" u="sng" dirty="0">
+                <a:solidFill>
+                  <a:schemeClr val="accent1">
+                    <a:lumMod val="50000"/>
+                  </a:schemeClr>
+                </a:solidFill>
+                <a:latin typeface="Poppins Medium" panose="00000600000000000000" pitchFamily="2" charset="0"/>
+                <a:cs typeface="Poppins Medium" panose="00000600000000000000" pitchFamily="2" charset="0"/>
+              </a:rPr>
+              <a:t>www.npmjs.com</a:t>
+            </a:r>
+          </a:p>
+          <a:p>
+            <a:pPr marL="285750" indent="-285750">
+              <a:buFont typeface="Arial" panose="020B0604020202020204" pitchFamily="34" charset="0"/>
+              <a:buChar char="•"/>
+            </a:pPr>
+            <a:endParaRPr lang="it-IT" sz="2800" dirty="0">
+              <a:latin typeface="Poppins Medium" panose="00000600000000000000" pitchFamily="2" charset="0"/>
+              <a:cs typeface="Poppins Medium" panose="00000600000000000000" pitchFamily="2" charset="0"/>
+            </a:endParaRPr>
+          </a:p>
+        </p:txBody>
+      </p:sp>
+      <p:pic>
+        <p:nvPicPr>
+          <p:cNvPr id="5" name="Immagine 4">
+            <a:extLst>
+              <a:ext uri="{FF2B5EF4-FFF2-40B4-BE49-F238E27FC236}">
+                <a16:creationId xmlns:a16="http://schemas.microsoft.com/office/drawing/2014/main" id="{2956BBD5-331D-AB6E-57E8-9F224D111E64}"/>
+              </a:ext>
+            </a:extLst>
+          </p:cNvPr>
+          <p:cNvPicPr>
+            <a:picLocks noChangeAspect="1"/>
+          </p:cNvPicPr>
+          <p:nvPr/>
+        </p:nvPicPr>
+        <p:blipFill>
+          <a:blip r:embed="rId3">
+            <a:extLst>
+              <a:ext uri="{BEBA8EAE-BF5A-486C-A8C5-ECC9F3942E4B}">
+                <a14:imgProps xmlns:a14="http://schemas.microsoft.com/office/drawing/2010/main">
+                  <a14:imgLayer r:embed="rId4">
+                    <a14:imgEffect>
+                      <a14:backgroundRemoval t="5556" b="88889" l="5983" r="96581">
+                        <a14:foregroundMark x1="35897" y1="72222" x2="14530" y2="69444"/>
+                        <a14:foregroundMark x1="14530" y1="69444" x2="32479" y2="19444"/>
+                        <a14:foregroundMark x1="32479" y1="19444" x2="41026" y2="22222"/>
+                        <a14:foregroundMark x1="17949" y1="75000" x2="29060" y2="16667"/>
+                        <a14:foregroundMark x1="29060" y1="16667" x2="29060" y2="16667"/>
+                        <a14:foregroundMark x1="21368" y1="27778" x2="8547" y2="27778"/>
+                        <a14:foregroundMark x1="17094" y1="72222" x2="5983" y2="30556"/>
+                        <a14:foregroundMark x1="8547" y1="77778" x2="23077" y2="77778"/>
+                        <a14:foregroundMark x1="90406" y1="35862" x2="91453" y2="27778"/>
+                        <a14:foregroundMark x1="85025" y1="77395" x2="86967" y2="62406"/>
+                        <a14:foregroundMark x1="96399" y1="33706" x2="96581" y2="30556"/>
+                        <a14:foregroundMark x1="94017" y1="75000" x2="94908" y2="59550"/>
+                        <a14:backgroundMark x1="97436" y1="33333" x2="98291" y2="58333"/>
+                        <a14:backgroundMark x1="72650" y1="94444" x2="69231" y2="88889"/>
+                        <a14:backgroundMark x1="74359" y1="88889" x2="80342" y2="88889"/>
+                      </a14:backgroundRemoval>
+                    </a14:imgEffect>
+                  </a14:imgLayer>
+                </a14:imgProps>
+              </a:ext>
+              <a:ext uri="{28A0092B-C50C-407E-A947-70E740481C1C}">
+                <a14:useLocalDpi xmlns:a14="http://schemas.microsoft.com/office/drawing/2010/main" val="0"/>
+              </a:ext>
+            </a:extLst>
+          </a:blip>
+          <a:stretch>
+            <a:fillRect/>
+          </a:stretch>
+        </p:blipFill>
+        <p:spPr>
+          <a:xfrm>
+            <a:off x="1959371" y="3348526"/>
+            <a:ext cx="2295277" cy="706240"/>
+          </a:xfrm>
+          <a:prstGeom prst="rect">
+            <a:avLst/>
+          </a:prstGeom>
+        </p:spPr>
+      </p:pic>
+      <p:pic>
+        <p:nvPicPr>
+          <p:cNvPr id="1026" name="Picture 2">
+            <a:extLst>
+              <a:ext uri="{FF2B5EF4-FFF2-40B4-BE49-F238E27FC236}">
+                <a16:creationId xmlns:a16="http://schemas.microsoft.com/office/drawing/2014/main" id="{93DE7F50-7A67-9A5C-7C0F-09A9BF43DDB4}"/>
+              </a:ext>
+            </a:extLst>
+          </p:cNvPr>
+          <p:cNvPicPr>
+            <a:picLocks noChangeAspect="1" noChangeArrowheads="1"/>
+          </p:cNvPicPr>
+          <p:nvPr/>
+        </p:nvPicPr>
+        <p:blipFill>
+          <a:blip r:embed="rId5">
+            <a:extLst>
+              <a:ext uri="{28A0092B-C50C-407E-A947-70E740481C1C}">
+                <a14:useLocalDpi xmlns:a14="http://schemas.microsoft.com/office/drawing/2010/main" val="0"/>
+              </a:ext>
+            </a:extLst>
+          </a:blip>
+          <a:srcRect/>
+          <a:stretch>
+            <a:fillRect/>
+          </a:stretch>
+        </p:blipFill>
+        <p:spPr bwMode="auto">
+          <a:xfrm>
+            <a:off x="735083" y="4135737"/>
+            <a:ext cx="4743855" cy="1844173"/>
+          </a:xfrm>
+          <a:prstGeom prst="rect">
+            <a:avLst/>
+          </a:prstGeom>
+          <a:noFill/>
+          <a:extLst>
+            <a:ext uri="{909E8E84-426E-40DD-AFC4-6F175D3DCCD1}">
+              <a14:hiddenFill xmlns:a14="http://schemas.microsoft.com/office/drawing/2010/main">
+                <a:solidFill>
+                  <a:srgbClr val="FFFFFF"/>
+                </a:solidFill>
+              </a14:hiddenFill>
+            </a:ext>
+          </a:extLst>
+        </p:spPr>
+      </p:pic>
+      <p:pic>
+        <p:nvPicPr>
+          <p:cNvPr id="1028" name="Picture 4" descr="90,233 Cube Illustrations &amp; Clip Art - iStock">
+            <a:extLst>
+              <a:ext uri="{FF2B5EF4-FFF2-40B4-BE49-F238E27FC236}">
+                <a16:creationId xmlns:a16="http://schemas.microsoft.com/office/drawing/2014/main" id="{7731BBA3-90B5-B1B5-7FDE-F9E633308F94}"/>
+              </a:ext>
+            </a:extLst>
+          </p:cNvPr>
+          <p:cNvPicPr>
+            <a:picLocks noChangeAspect="1" noChangeArrowheads="1"/>
+          </p:cNvPicPr>
+          <p:nvPr/>
+        </p:nvPicPr>
+        <p:blipFill>
+          <a:blip r:embed="rId6">
+            <a:extLst>
+              <a:ext uri="{BEBA8EAE-BF5A-486C-A8C5-ECC9F3942E4B}">
+                <a14:imgProps xmlns:a14="http://schemas.microsoft.com/office/drawing/2010/main">
+                  <a14:imgLayer r:embed="rId7">
+                    <a14:imgEffect>
+                      <a14:backgroundRemoval t="8333" b="89869" l="9967" r="89869">
+                        <a14:foregroundMark x1="50490" y1="10131" x2="49837" y2="8333"/>
+                      </a14:backgroundRemoval>
+                    </a14:imgEffect>
+                    <a14:imgEffect>
+                      <a14:colorTemperature colorTemp="4700"/>
+                    </a14:imgEffect>
+                  </a14:imgLayer>
+                </a14:imgProps>
+              </a:ext>
+              <a:ext uri="{28A0092B-C50C-407E-A947-70E740481C1C}">
+                <a14:useLocalDpi xmlns:a14="http://schemas.microsoft.com/office/drawing/2010/main" val="0"/>
+              </a:ext>
+            </a:extLst>
+          </a:blip>
+          <a:srcRect/>
+          <a:stretch>
+            <a:fillRect/>
+          </a:stretch>
+        </p:blipFill>
+        <p:spPr bwMode="auto">
+          <a:xfrm>
+            <a:off x="6290258" y="1141845"/>
+            <a:ext cx="5319298" cy="5319298"/>
+          </a:xfrm>
+          <a:prstGeom prst="rect">
+            <a:avLst/>
+          </a:prstGeom>
+          <a:noFill/>
+          <a:extLst>
+            <a:ext uri="{909E8E84-426E-40DD-AFC4-6F175D3DCCD1}">
+              <a14:hiddenFill xmlns:a14="http://schemas.microsoft.com/office/drawing/2010/main">
+                <a:solidFill>
+                  <a:srgbClr val="FFFFFF"/>
+                </a:solidFill>
+              </a14:hiddenFill>
+            </a:ext>
+          </a:extLst>
+        </p:spPr>
+      </p:pic>
+    </p:spTree>
+    <p:extLst>
+      <p:ext uri="{BB962C8B-B14F-4D97-AF65-F5344CB8AC3E}">
+        <p14:creationId xmlns:p14="http://schemas.microsoft.com/office/powerpoint/2010/main" val="3738660082"/>
+      </p:ext>
+    </p:extLst>
+  </p:cSld>
+  <p:clrMapOvr>
+    <a:masterClrMapping/>
+  </p:clrMapOvr>
+</p:sld>
+</file>
+
+<file path=ppt/slides/slide29.xml><?xml version="1.0" encoding="utf-8"?>
+<p:sld xmlns:a="http://schemas.openxmlformats.org/drawingml/2006/main" xmlns:r="http://schemas.openxmlformats.org/officeDocument/2006/relationships" xmlns:p="http://schemas.openxmlformats.org/presentationml/2006/main">
+  <p:cSld>
+    <p:spTree>
+      <p:nvGrpSpPr>
+        <p:cNvPr id="1" name=""/>
+        <p:cNvGrpSpPr/>
+        <p:nvPr/>
+      </p:nvGrpSpPr>
+      <p:grpSpPr>
+        <a:xfrm>
+          <a:off x="0" y="0"/>
+          <a:ext cx="0" cy="0"/>
+          <a:chOff x="0" y="0"/>
+          <a:chExt cx="0" cy="0"/>
+        </a:xfrm>
+      </p:grpSpPr>
+      <p:sp>
+        <p:nvSpPr>
           <p:cNvPr id="9" name="Rettangolo 8">
             <a:extLst>
               <a:ext uri="{FF2B5EF4-FFF2-40B4-BE49-F238E27FC236}">
@@ -17818,7 +18903,7 @@
                 <a:cs typeface="Poppins Medium" panose="00000600000000000000" pitchFamily="2" charset="0"/>
               </a:rPr>
               <a:pPr/>
-              <a:t>28</a:t>
+              <a:t>29</a:t>
             </a:fld>
             <a:r>
               <a:rPr lang="de-DE" sz="1600">
@@ -17892,7 +18977,1822 @@
 </p:sld>
 </file>
 
-<file path=ppt/slides/slide29.xml><?xml version="1.0" encoding="utf-8"?>
+<file path=ppt/slides/slide3.xml><?xml version="1.0" encoding="utf-8"?>
+<p:sld xmlns:a="http://schemas.openxmlformats.org/drawingml/2006/main" xmlns:r="http://schemas.openxmlformats.org/officeDocument/2006/relationships" xmlns:p="http://schemas.openxmlformats.org/presentationml/2006/main">
+  <p:cSld>
+    <p:spTree>
+      <p:nvGrpSpPr>
+        <p:cNvPr id="1" name=""/>
+        <p:cNvGrpSpPr/>
+        <p:nvPr/>
+      </p:nvGrpSpPr>
+      <p:grpSpPr>
+        <a:xfrm>
+          <a:off x="0" y="0"/>
+          <a:ext cx="0" cy="0"/>
+          <a:chOff x="0" y="0"/>
+          <a:chExt cx="0" cy="0"/>
+        </a:xfrm>
+      </p:grpSpPr>
+      <p:sp>
+        <p:nvSpPr>
+          <p:cNvPr id="7" name="Segnaposto contenuto 6">
+            <a:extLst>
+              <a:ext uri="{FF2B5EF4-FFF2-40B4-BE49-F238E27FC236}">
+                <a16:creationId xmlns:a16="http://schemas.microsoft.com/office/drawing/2014/main" id="{02FC6CA0-25CF-64B7-760B-56A8388FA257}"/>
+              </a:ext>
+            </a:extLst>
+          </p:cNvPr>
+          <p:cNvSpPr>
+            <a:spLocks noGrp="1"/>
+          </p:cNvSpPr>
+          <p:nvPr>
+            <p:ph idx="1"/>
+          </p:nvPr>
+        </p:nvSpPr>
+        <p:spPr/>
+        <p:txBody>
+          <a:bodyPr/>
+          <a:lstStyle/>
+          <a:p>
+            <a:pPr marL="0" indent="0">
+              <a:buNone/>
+            </a:pPr>
+            <a:r>
+              <a:rPr lang="it-IT" sz="2400" dirty="0">
+                <a:latin typeface="Poppins Medium" panose="00000600000000000000" pitchFamily="2" charset="0"/>
+                <a:cs typeface="Poppins Medium" panose="00000600000000000000" pitchFamily="2" charset="0"/>
+              </a:rPr>
+              <a:t>Per aprire una </a:t>
+            </a:r>
+            <a:r>
+              <a:rPr lang="it-IT" sz="2400" dirty="0" err="1">
+                <a:latin typeface="Poppins Medium" panose="00000600000000000000" pitchFamily="2" charset="0"/>
+                <a:cs typeface="Poppins Medium" panose="00000600000000000000" pitchFamily="2" charset="0"/>
+              </a:rPr>
+              <a:t>issue</a:t>
+            </a:r>
+            <a:r>
+              <a:rPr lang="it-IT" sz="2400" dirty="0">
+                <a:latin typeface="Poppins Medium" panose="00000600000000000000" pitchFamily="2" charset="0"/>
+                <a:cs typeface="Poppins Medium" panose="00000600000000000000" pitchFamily="2" charset="0"/>
+              </a:rPr>
+              <a:t> si deve usare:</a:t>
+            </a:r>
+          </a:p>
+          <a:p>
+            <a:pPr marL="0" indent="0">
+              <a:buNone/>
+            </a:pPr>
+            <a:r>
+              <a:rPr lang="it-IT" sz="2400" dirty="0">
+                <a:solidFill>
+                  <a:schemeClr val="accent1">
+                    <a:lumMod val="75000"/>
+                  </a:schemeClr>
+                </a:solidFill>
+                <a:latin typeface="Poppins" panose="00000500000000000000" pitchFamily="2" charset="0"/>
+                <a:cs typeface="Poppins" panose="00000500000000000000" pitchFamily="2" charset="0"/>
+                <a:hlinkClick r:id="rId3"/>
+              </a:rPr>
+              <a:t>https://new-issue.vuejs.org/?repo=vuejs/core#</a:t>
+            </a:r>
+            <a:endParaRPr lang="it-IT" sz="2400" dirty="0">
+              <a:solidFill>
+                <a:schemeClr val="accent1">
+                  <a:lumMod val="75000"/>
+                </a:schemeClr>
+              </a:solidFill>
+              <a:latin typeface="Poppins" panose="00000500000000000000" pitchFamily="2" charset="0"/>
+              <a:cs typeface="Poppins" panose="00000500000000000000" pitchFamily="2" charset="0"/>
+            </a:endParaRPr>
+          </a:p>
+          <a:p>
+            <a:pPr marL="0" indent="0">
+              <a:buNone/>
+            </a:pPr>
+            <a:endParaRPr lang="it-IT" dirty="0">
+              <a:solidFill>
+                <a:schemeClr val="accent1">
+                  <a:lumMod val="75000"/>
+                </a:schemeClr>
+              </a:solidFill>
+            </a:endParaRPr>
+          </a:p>
+        </p:txBody>
+      </p:sp>
+      <p:sp>
+        <p:nvSpPr>
+          <p:cNvPr id="25" name="Segnaposto data 24">
+            <a:extLst>
+              <a:ext uri="{FF2B5EF4-FFF2-40B4-BE49-F238E27FC236}">
+                <a16:creationId xmlns:a16="http://schemas.microsoft.com/office/drawing/2014/main" id="{115DF917-AC48-486A-81F6-CF2DBBF5CD89}"/>
+              </a:ext>
+            </a:extLst>
+          </p:cNvPr>
+          <p:cNvSpPr>
+            <a:spLocks noGrp="1"/>
+          </p:cNvSpPr>
+          <p:nvPr>
+            <p:ph type="dt" sz="half" idx="10"/>
+          </p:nvPr>
+        </p:nvSpPr>
+        <p:spPr/>
+        <p:txBody>
+          <a:bodyPr/>
+          <a:lstStyle/>
+          <a:p>
+            <a:r>
+              <a:rPr lang="it-IT" sz="1600">
+                <a:solidFill>
+                  <a:schemeClr val="tx1"/>
+                </a:solidFill>
+                <a:latin typeface="Poppins Medium" panose="00000600000000000000" pitchFamily="2" charset="0"/>
+                <a:cs typeface="Poppins Medium" panose="00000600000000000000" pitchFamily="2" charset="0"/>
+              </a:rPr>
+              <a:t>31 Maggio 2022</a:t>
+            </a:r>
+            <a:endParaRPr lang="de-DE" sz="1600">
+              <a:solidFill>
+                <a:schemeClr val="tx1"/>
+              </a:solidFill>
+              <a:latin typeface="Poppins Medium" panose="00000600000000000000" pitchFamily="2" charset="0"/>
+              <a:cs typeface="Poppins Medium" panose="00000600000000000000" pitchFamily="2" charset="0"/>
+            </a:endParaRPr>
+          </a:p>
+        </p:txBody>
+      </p:sp>
+      <p:sp>
+        <p:nvSpPr>
+          <p:cNvPr id="27" name="Segnaposto numero diapositiva 26">
+            <a:extLst>
+              <a:ext uri="{FF2B5EF4-FFF2-40B4-BE49-F238E27FC236}">
+                <a16:creationId xmlns:a16="http://schemas.microsoft.com/office/drawing/2014/main" id="{F9C2EE25-215B-477C-AC6E-D2639B7A24B6}"/>
+              </a:ext>
+            </a:extLst>
+          </p:cNvPr>
+          <p:cNvSpPr>
+            <a:spLocks noGrp="1"/>
+          </p:cNvSpPr>
+          <p:nvPr>
+            <p:ph type="sldNum" sz="quarter" idx="12"/>
+          </p:nvPr>
+        </p:nvSpPr>
+        <p:spPr/>
+        <p:txBody>
+          <a:bodyPr/>
+          <a:lstStyle/>
+          <a:p>
+            <a:fld id="{66CD45B7-DFE2-4393-8D37-380FC36BF3AA}" type="slidenum">
+              <a:rPr lang="de-DE" sz="1600" smtClean="0">
+                <a:solidFill>
+                  <a:schemeClr val="tx1"/>
+                </a:solidFill>
+                <a:latin typeface="Poppins Medium" panose="00000600000000000000" pitchFamily="2" charset="0"/>
+                <a:cs typeface="Poppins Medium" panose="00000600000000000000" pitchFamily="2" charset="0"/>
+              </a:rPr>
+              <a:t>3</a:t>
+            </a:fld>
+            <a:r>
+              <a:rPr lang="de-DE" sz="1600">
+                <a:solidFill>
+                  <a:schemeClr val="tx1"/>
+                </a:solidFill>
+                <a:latin typeface="Poppins Medium" panose="00000600000000000000" pitchFamily="2" charset="0"/>
+                <a:cs typeface="Poppins Medium" panose="00000600000000000000" pitchFamily="2" charset="0"/>
+              </a:rPr>
+              <a:t>/16</a:t>
+            </a:r>
+          </a:p>
+        </p:txBody>
+      </p:sp>
+      <p:pic>
+        <p:nvPicPr>
+          <p:cNvPr id="9" name="Immagine 8" descr="Immagine che contiene testo&#10;&#10;Descrizione generata automaticamente">
+            <a:extLst>
+              <a:ext uri="{FF2B5EF4-FFF2-40B4-BE49-F238E27FC236}">
+                <a16:creationId xmlns:a16="http://schemas.microsoft.com/office/drawing/2014/main" id="{F95EC3CA-A266-0594-7DBD-E728DB78F0E8}"/>
+              </a:ext>
+            </a:extLst>
+          </p:cNvPr>
+          <p:cNvPicPr>
+            <a:picLocks noChangeAspect="1"/>
+          </p:cNvPicPr>
+          <p:nvPr/>
+        </p:nvPicPr>
+        <p:blipFill>
+          <a:blip r:embed="rId4">
+            <a:extLst>
+              <a:ext uri="{28A0092B-C50C-407E-A947-70E740481C1C}">
+                <a14:useLocalDpi xmlns:a14="http://schemas.microsoft.com/office/drawing/2010/main" val="0"/>
+              </a:ext>
+            </a:extLst>
+          </a:blip>
+          <a:stretch>
+            <a:fillRect/>
+          </a:stretch>
+        </p:blipFill>
+        <p:spPr>
+          <a:xfrm>
+            <a:off x="838200" y="2903620"/>
+            <a:ext cx="7292926" cy="3247695"/>
+          </a:xfrm>
+          <a:prstGeom prst="rect">
+            <a:avLst/>
+          </a:prstGeom>
+        </p:spPr>
+      </p:pic>
+      <p:sp>
+        <p:nvSpPr>
+          <p:cNvPr id="24" name="Rettangolo 23">
+            <a:extLst>
+              <a:ext uri="{FF2B5EF4-FFF2-40B4-BE49-F238E27FC236}">
+                <a16:creationId xmlns:a16="http://schemas.microsoft.com/office/drawing/2014/main" id="{71C5E46E-415B-CDB4-BE22-19B4CD41D603}"/>
+              </a:ext>
+            </a:extLst>
+          </p:cNvPr>
+          <p:cNvSpPr/>
+          <p:nvPr/>
+        </p:nvSpPr>
+        <p:spPr>
+          <a:xfrm>
+            <a:off x="0" y="0"/>
+            <a:ext cx="12184913" cy="1034891"/>
+          </a:xfrm>
+          <a:prstGeom prst="rect">
+            <a:avLst/>
+          </a:prstGeom>
+          <a:solidFill>
+            <a:srgbClr val="002060"/>
+          </a:solidFill>
+          <a:ln>
+            <a:noFill/>
+          </a:ln>
+        </p:spPr>
+        <p:style>
+          <a:lnRef idx="2">
+            <a:schemeClr val="accent3">
+              <a:shade val="50000"/>
+            </a:schemeClr>
+          </a:lnRef>
+          <a:fillRef idx="1">
+            <a:schemeClr val="accent3"/>
+          </a:fillRef>
+          <a:effectRef idx="0">
+            <a:schemeClr val="accent3"/>
+          </a:effectRef>
+          <a:fontRef idx="minor">
+            <a:schemeClr val="lt1"/>
+          </a:fontRef>
+        </p:style>
+        <p:txBody>
+          <a:bodyPr rtlCol="0" anchor="ctr"/>
+          <a:lstStyle/>
+          <a:p>
+            <a:pPr algn="ctr"/>
+            <a:endParaRPr lang="it-IT"/>
+          </a:p>
+        </p:txBody>
+      </p:sp>
+      <p:sp>
+        <p:nvSpPr>
+          <p:cNvPr id="28" name="Titolo 1">
+            <a:extLst>
+              <a:ext uri="{FF2B5EF4-FFF2-40B4-BE49-F238E27FC236}">
+                <a16:creationId xmlns:a16="http://schemas.microsoft.com/office/drawing/2014/main" id="{B5D7AE2C-90E2-7B91-00EC-386C77D3753C}"/>
+              </a:ext>
+            </a:extLst>
+          </p:cNvPr>
+          <p:cNvSpPr>
+            <a:spLocks noGrp="1"/>
+          </p:cNvSpPr>
+          <p:nvPr>
+            <p:ph type="title"/>
+          </p:nvPr>
+        </p:nvSpPr>
+        <p:spPr>
+          <a:xfrm>
+            <a:off x="272535" y="163591"/>
+            <a:ext cx="10176803" cy="707708"/>
+          </a:xfrm>
+        </p:spPr>
+        <p:txBody>
+          <a:bodyPr anchor="b">
+            <a:normAutofit/>
+          </a:bodyPr>
+          <a:lstStyle/>
+          <a:p>
+            <a:r>
+              <a:rPr lang="it-IT" sz="4000" b="1" dirty="0">
+                <a:solidFill>
+                  <a:schemeClr val="bg1"/>
+                </a:solidFill>
+                <a:effectLst>
+                  <a:outerShdw blurRad="38100" dist="38100" dir="2700000" algn="tl">
+                    <a:srgbClr val="000000">
+                      <a:alpha val="43137"/>
+                    </a:srgbClr>
+                  </a:outerShdw>
+                </a:effectLst>
+                <a:latin typeface="Poppins"/>
+                <a:cs typeface="Poppins"/>
+              </a:rPr>
+              <a:t>Apertura </a:t>
+            </a:r>
+            <a:r>
+              <a:rPr lang="it-IT" sz="4000" b="1" dirty="0" err="1">
+                <a:solidFill>
+                  <a:schemeClr val="bg1"/>
+                </a:solidFill>
+                <a:effectLst>
+                  <a:outerShdw blurRad="38100" dist="38100" dir="2700000" algn="tl">
+                    <a:srgbClr val="000000">
+                      <a:alpha val="43137"/>
+                    </a:srgbClr>
+                  </a:outerShdw>
+                </a:effectLst>
+                <a:latin typeface="Poppins"/>
+                <a:cs typeface="Poppins"/>
+              </a:rPr>
+              <a:t>issues</a:t>
+            </a:r>
+            <a:endParaRPr lang="it-IT" sz="4000" b="1" dirty="0">
+              <a:solidFill>
+                <a:schemeClr val="bg1"/>
+              </a:solidFill>
+              <a:effectLst>
+                <a:outerShdw blurRad="38100" dist="38100" dir="2700000" algn="tl">
+                  <a:srgbClr val="000000">
+                    <a:alpha val="43137"/>
+                  </a:srgbClr>
+                </a:outerShdw>
+              </a:effectLst>
+              <a:latin typeface="Poppins"/>
+              <a:cs typeface="Poppins"/>
+            </a:endParaRPr>
+          </a:p>
+        </p:txBody>
+      </p:sp>
+    </p:spTree>
+    <p:extLst>
+      <p:ext uri="{BB962C8B-B14F-4D97-AF65-F5344CB8AC3E}">
+        <p14:creationId xmlns:p14="http://schemas.microsoft.com/office/powerpoint/2010/main" val="4282466121"/>
+      </p:ext>
+    </p:extLst>
+  </p:cSld>
+  <p:clrMapOvr>
+    <a:masterClrMapping/>
+  </p:clrMapOvr>
+</p:sld>
+</file>
+
+<file path=ppt/slides/slide30.xml><?xml version="1.0" encoding="utf-8"?>
+<p:sld xmlns:a="http://schemas.openxmlformats.org/drawingml/2006/main" xmlns:r="http://schemas.openxmlformats.org/officeDocument/2006/relationships" xmlns:p="http://schemas.openxmlformats.org/presentationml/2006/main">
+  <p:cSld>
+    <p:spTree>
+      <p:nvGrpSpPr>
+        <p:cNvPr id="1" name=""/>
+        <p:cNvGrpSpPr/>
+        <p:nvPr/>
+      </p:nvGrpSpPr>
+      <p:grpSpPr>
+        <a:xfrm>
+          <a:off x="0" y="0"/>
+          <a:ext cx="0" cy="0"/>
+          <a:chOff x="0" y="0"/>
+          <a:chExt cx="0" cy="0"/>
+        </a:xfrm>
+      </p:grpSpPr>
+      <p:sp>
+        <p:nvSpPr>
+          <p:cNvPr id="25" name="Segnaposto data 24">
+            <a:extLst>
+              <a:ext uri="{FF2B5EF4-FFF2-40B4-BE49-F238E27FC236}">
+                <a16:creationId xmlns:a16="http://schemas.microsoft.com/office/drawing/2014/main" id="{115DF917-AC48-486A-81F6-CF2DBBF5CD89}"/>
+              </a:ext>
+            </a:extLst>
+          </p:cNvPr>
+          <p:cNvSpPr>
+            <a:spLocks noGrp="1"/>
+          </p:cNvSpPr>
+          <p:nvPr>
+            <p:ph type="dt" sz="half" idx="10"/>
+          </p:nvPr>
+        </p:nvSpPr>
+        <p:spPr/>
+        <p:txBody>
+          <a:bodyPr/>
+          <a:lstStyle/>
+          <a:p>
+            <a:r>
+              <a:rPr lang="it-IT" sz="1600">
+                <a:solidFill>
+                  <a:schemeClr val="tx1"/>
+                </a:solidFill>
+                <a:latin typeface="Poppins Medium" panose="00000600000000000000" pitchFamily="2" charset="0"/>
+                <a:cs typeface="Poppins Medium" panose="00000600000000000000" pitchFamily="2" charset="0"/>
+              </a:rPr>
+              <a:t>31 Maggio 2022</a:t>
+            </a:r>
+            <a:endParaRPr lang="de-DE" sz="1600">
+              <a:solidFill>
+                <a:schemeClr val="tx1"/>
+              </a:solidFill>
+              <a:latin typeface="Poppins Medium" panose="00000600000000000000" pitchFamily="2" charset="0"/>
+              <a:cs typeface="Poppins Medium" panose="00000600000000000000" pitchFamily="2" charset="0"/>
+            </a:endParaRPr>
+          </a:p>
+        </p:txBody>
+      </p:sp>
+      <p:sp>
+        <p:nvSpPr>
+          <p:cNvPr id="27" name="Segnaposto numero diapositiva 26">
+            <a:extLst>
+              <a:ext uri="{FF2B5EF4-FFF2-40B4-BE49-F238E27FC236}">
+                <a16:creationId xmlns:a16="http://schemas.microsoft.com/office/drawing/2014/main" id="{F9C2EE25-215B-477C-AC6E-D2639B7A24B6}"/>
+              </a:ext>
+            </a:extLst>
+          </p:cNvPr>
+          <p:cNvSpPr>
+            <a:spLocks noGrp="1"/>
+          </p:cNvSpPr>
+          <p:nvPr>
+            <p:ph type="sldNum" sz="quarter" idx="12"/>
+          </p:nvPr>
+        </p:nvSpPr>
+        <p:spPr/>
+        <p:txBody>
+          <a:bodyPr/>
+          <a:lstStyle/>
+          <a:p>
+            <a:fld id="{66CD45B7-DFE2-4393-8D37-380FC36BF3AA}" type="slidenum">
+              <a:rPr lang="de-DE" sz="1600" smtClean="0">
+                <a:solidFill>
+                  <a:schemeClr val="tx1"/>
+                </a:solidFill>
+                <a:latin typeface="Poppins Medium" panose="00000600000000000000" pitchFamily="2" charset="0"/>
+                <a:cs typeface="Poppins Medium" panose="00000600000000000000" pitchFamily="2" charset="0"/>
+              </a:rPr>
+              <a:t>30</a:t>
+            </a:fld>
+            <a:r>
+              <a:rPr lang="de-DE" sz="1600" dirty="0">
+                <a:solidFill>
+                  <a:schemeClr val="tx1"/>
+                </a:solidFill>
+                <a:latin typeface="Poppins Medium" panose="00000600000000000000" pitchFamily="2" charset="0"/>
+                <a:cs typeface="Poppins Medium" panose="00000600000000000000" pitchFamily="2" charset="0"/>
+              </a:rPr>
+              <a:t>/16</a:t>
+            </a:r>
+          </a:p>
+        </p:txBody>
+      </p:sp>
+      <p:sp>
+        <p:nvSpPr>
+          <p:cNvPr id="12" name="Rettangolo 11">
+            <a:extLst>
+              <a:ext uri="{FF2B5EF4-FFF2-40B4-BE49-F238E27FC236}">
+                <a16:creationId xmlns:a16="http://schemas.microsoft.com/office/drawing/2014/main" id="{F0FAD030-2623-A89C-4FA1-55CE81C0AE08}"/>
+              </a:ext>
+            </a:extLst>
+          </p:cNvPr>
+          <p:cNvSpPr/>
+          <p:nvPr/>
+        </p:nvSpPr>
+        <p:spPr>
+          <a:xfrm>
+            <a:off x="0" y="0"/>
+            <a:ext cx="12184913" cy="1034891"/>
+          </a:xfrm>
+          <a:prstGeom prst="rect">
+            <a:avLst/>
+          </a:prstGeom>
+          <a:solidFill>
+            <a:srgbClr val="002060"/>
+          </a:solidFill>
+          <a:ln>
+            <a:noFill/>
+          </a:ln>
+        </p:spPr>
+        <p:style>
+          <a:lnRef idx="2">
+            <a:schemeClr val="accent3">
+              <a:shade val="50000"/>
+            </a:schemeClr>
+          </a:lnRef>
+          <a:fillRef idx="1">
+            <a:schemeClr val="accent3"/>
+          </a:fillRef>
+          <a:effectRef idx="0">
+            <a:schemeClr val="accent3"/>
+          </a:effectRef>
+          <a:fontRef idx="minor">
+            <a:schemeClr val="lt1"/>
+          </a:fontRef>
+        </p:style>
+        <p:txBody>
+          <a:bodyPr rtlCol="0" anchor="ctr"/>
+          <a:lstStyle/>
+          <a:p>
+            <a:pPr algn="ctr"/>
+            <a:endParaRPr lang="it-IT"/>
+          </a:p>
+        </p:txBody>
+      </p:sp>
+      <p:sp>
+        <p:nvSpPr>
+          <p:cNvPr id="13" name="Titolo 1">
+            <a:extLst>
+              <a:ext uri="{FF2B5EF4-FFF2-40B4-BE49-F238E27FC236}">
+                <a16:creationId xmlns:a16="http://schemas.microsoft.com/office/drawing/2014/main" id="{A0F14F07-00BE-A130-44A5-463A5F98673C}"/>
+              </a:ext>
+            </a:extLst>
+          </p:cNvPr>
+          <p:cNvSpPr>
+            <a:spLocks noGrp="1"/>
+          </p:cNvSpPr>
+          <p:nvPr>
+            <p:ph type="title"/>
+          </p:nvPr>
+        </p:nvSpPr>
+        <p:spPr>
+          <a:xfrm>
+            <a:off x="272535" y="163591"/>
+            <a:ext cx="10176803" cy="707708"/>
+          </a:xfrm>
+        </p:spPr>
+        <p:txBody>
+          <a:bodyPr anchor="b">
+            <a:normAutofit/>
+          </a:bodyPr>
+          <a:lstStyle/>
+          <a:p>
+            <a:r>
+              <a:rPr lang="it-IT" sz="4000" b="1" dirty="0">
+                <a:solidFill>
+                  <a:schemeClr val="bg1"/>
+                </a:solidFill>
+                <a:latin typeface="Poppins"/>
+                <a:cs typeface="Poppins"/>
+              </a:rPr>
+              <a:t>CD-Strumento utilizzato</a:t>
+            </a:r>
+          </a:p>
+        </p:txBody>
+      </p:sp>
+      <p:sp>
+        <p:nvSpPr>
+          <p:cNvPr id="8" name="Segnaposto contenuto 6">
+            <a:extLst>
+              <a:ext uri="{FF2B5EF4-FFF2-40B4-BE49-F238E27FC236}">
+                <a16:creationId xmlns:a16="http://schemas.microsoft.com/office/drawing/2014/main" id="{F832EED3-9182-E3BD-D2D5-1723AFD8A0BD}"/>
+              </a:ext>
+            </a:extLst>
+          </p:cNvPr>
+          <p:cNvSpPr txBox="1">
+            <a:spLocks/>
+          </p:cNvSpPr>
+          <p:nvPr/>
+        </p:nvSpPr>
+        <p:spPr>
+          <a:xfrm>
+            <a:off x="834656" y="2005012"/>
+            <a:ext cx="10515600" cy="4351338"/>
+          </a:xfrm>
+          <a:prstGeom prst="rect">
+            <a:avLst/>
+          </a:prstGeom>
+        </p:spPr>
+        <p:txBody>
+          <a:bodyPr vert="horz" lIns="91440" tIns="45720" rIns="91440" bIns="45720" rtlCol="0">
+            <a:normAutofit/>
+          </a:bodyPr>
+          <a:lstStyle>
+            <a:lvl1pPr marL="228600" indent="-228600" algn="l" defTabSz="914400" rtl="0" eaLnBrk="1" latinLnBrk="0" hangingPunct="1">
+              <a:lnSpc>
+                <a:spcPct val="90000"/>
+              </a:lnSpc>
+              <a:spcBef>
+                <a:spcPts val="1000"/>
+              </a:spcBef>
+              <a:buFont typeface="Arial" panose="020B0604020202020204" pitchFamily="34" charset="0"/>
+              <a:buChar char="•"/>
+              <a:defRPr sz="2800" kern="1200">
+                <a:solidFill>
+                  <a:schemeClr val="tx1"/>
+                </a:solidFill>
+                <a:latin typeface="+mn-lt"/>
+                <a:ea typeface="+mn-ea"/>
+                <a:cs typeface="+mn-cs"/>
+              </a:defRPr>
+            </a:lvl1pPr>
+            <a:lvl2pPr marL="685800" indent="-228600" algn="l" defTabSz="914400" rtl="0" eaLnBrk="1" latinLnBrk="0" hangingPunct="1">
+              <a:lnSpc>
+                <a:spcPct val="90000"/>
+              </a:lnSpc>
+              <a:spcBef>
+                <a:spcPts val="500"/>
+              </a:spcBef>
+              <a:buFont typeface="Arial" panose="020B0604020202020204" pitchFamily="34" charset="0"/>
+              <a:buChar char="•"/>
+              <a:defRPr sz="2400" kern="1200">
+                <a:solidFill>
+                  <a:schemeClr val="tx1"/>
+                </a:solidFill>
+                <a:latin typeface="+mn-lt"/>
+                <a:ea typeface="+mn-ea"/>
+                <a:cs typeface="+mn-cs"/>
+              </a:defRPr>
+            </a:lvl2pPr>
+            <a:lvl3pPr marL="1143000" indent="-228600" algn="l" defTabSz="914400" rtl="0" eaLnBrk="1" latinLnBrk="0" hangingPunct="1">
+              <a:lnSpc>
+                <a:spcPct val="90000"/>
+              </a:lnSpc>
+              <a:spcBef>
+                <a:spcPts val="500"/>
+              </a:spcBef>
+              <a:buFont typeface="Arial" panose="020B0604020202020204" pitchFamily="34" charset="0"/>
+              <a:buChar char="•"/>
+              <a:defRPr sz="2000" kern="1200">
+                <a:solidFill>
+                  <a:schemeClr val="tx1"/>
+                </a:solidFill>
+                <a:latin typeface="+mn-lt"/>
+                <a:ea typeface="+mn-ea"/>
+                <a:cs typeface="+mn-cs"/>
+              </a:defRPr>
+            </a:lvl3pPr>
+            <a:lvl4pPr marL="1600200" indent="-228600" algn="l" defTabSz="914400" rtl="0" eaLnBrk="1" latinLnBrk="0" hangingPunct="1">
+              <a:lnSpc>
+                <a:spcPct val="90000"/>
+              </a:lnSpc>
+              <a:spcBef>
+                <a:spcPts val="500"/>
+              </a:spcBef>
+              <a:buFont typeface="Arial" panose="020B0604020202020204" pitchFamily="34" charset="0"/>
+              <a:buChar char="•"/>
+              <a:defRPr sz="1800" kern="1200">
+                <a:solidFill>
+                  <a:schemeClr val="tx1"/>
+                </a:solidFill>
+                <a:latin typeface="+mn-lt"/>
+                <a:ea typeface="+mn-ea"/>
+                <a:cs typeface="+mn-cs"/>
+              </a:defRPr>
+            </a:lvl4pPr>
+            <a:lvl5pPr marL="2057400" indent="-228600" algn="l" defTabSz="914400" rtl="0" eaLnBrk="1" latinLnBrk="0" hangingPunct="1">
+              <a:lnSpc>
+                <a:spcPct val="90000"/>
+              </a:lnSpc>
+              <a:spcBef>
+                <a:spcPts val="500"/>
+              </a:spcBef>
+              <a:buFont typeface="Arial" panose="020B0604020202020204" pitchFamily="34" charset="0"/>
+              <a:buChar char="•"/>
+              <a:defRPr sz="1800" kern="1200">
+                <a:solidFill>
+                  <a:schemeClr val="tx1"/>
+                </a:solidFill>
+                <a:latin typeface="+mn-lt"/>
+                <a:ea typeface="+mn-ea"/>
+                <a:cs typeface="+mn-cs"/>
+              </a:defRPr>
+            </a:lvl5pPr>
+            <a:lvl6pPr marL="2514600" indent="-228600" algn="l" defTabSz="914400" rtl="0" eaLnBrk="1" latinLnBrk="0" hangingPunct="1">
+              <a:lnSpc>
+                <a:spcPct val="90000"/>
+              </a:lnSpc>
+              <a:spcBef>
+                <a:spcPts val="500"/>
+              </a:spcBef>
+              <a:buFont typeface="Arial" panose="020B0604020202020204" pitchFamily="34" charset="0"/>
+              <a:buChar char="•"/>
+              <a:defRPr sz="1800" kern="1200">
+                <a:solidFill>
+                  <a:schemeClr val="tx1"/>
+                </a:solidFill>
+                <a:latin typeface="+mn-lt"/>
+                <a:ea typeface="+mn-ea"/>
+                <a:cs typeface="+mn-cs"/>
+              </a:defRPr>
+            </a:lvl6pPr>
+            <a:lvl7pPr marL="2971800" indent="-228600" algn="l" defTabSz="914400" rtl="0" eaLnBrk="1" latinLnBrk="0" hangingPunct="1">
+              <a:lnSpc>
+                <a:spcPct val="90000"/>
+              </a:lnSpc>
+              <a:spcBef>
+                <a:spcPts val="500"/>
+              </a:spcBef>
+              <a:buFont typeface="Arial" panose="020B0604020202020204" pitchFamily="34" charset="0"/>
+              <a:buChar char="•"/>
+              <a:defRPr sz="1800" kern="1200">
+                <a:solidFill>
+                  <a:schemeClr val="tx1"/>
+                </a:solidFill>
+                <a:latin typeface="+mn-lt"/>
+                <a:ea typeface="+mn-ea"/>
+                <a:cs typeface="+mn-cs"/>
+              </a:defRPr>
+            </a:lvl7pPr>
+            <a:lvl8pPr marL="3429000" indent="-228600" algn="l" defTabSz="914400" rtl="0" eaLnBrk="1" latinLnBrk="0" hangingPunct="1">
+              <a:lnSpc>
+                <a:spcPct val="90000"/>
+              </a:lnSpc>
+              <a:spcBef>
+                <a:spcPts val="500"/>
+              </a:spcBef>
+              <a:buFont typeface="Arial" panose="020B0604020202020204" pitchFamily="34" charset="0"/>
+              <a:buChar char="•"/>
+              <a:defRPr sz="1800" kern="1200">
+                <a:solidFill>
+                  <a:schemeClr val="tx1"/>
+                </a:solidFill>
+                <a:latin typeface="+mn-lt"/>
+                <a:ea typeface="+mn-ea"/>
+                <a:cs typeface="+mn-cs"/>
+              </a:defRPr>
+            </a:lvl8pPr>
+            <a:lvl9pPr marL="3886200" indent="-228600" algn="l" defTabSz="914400" rtl="0" eaLnBrk="1" latinLnBrk="0" hangingPunct="1">
+              <a:lnSpc>
+                <a:spcPct val="90000"/>
+              </a:lnSpc>
+              <a:spcBef>
+                <a:spcPts val="500"/>
+              </a:spcBef>
+              <a:buFont typeface="Arial" panose="020B0604020202020204" pitchFamily="34" charset="0"/>
+              <a:buChar char="•"/>
+              <a:defRPr sz="1800" kern="1200">
+                <a:solidFill>
+                  <a:schemeClr val="tx1"/>
+                </a:solidFill>
+                <a:latin typeface="+mn-lt"/>
+                <a:ea typeface="+mn-ea"/>
+                <a:cs typeface="+mn-cs"/>
+              </a:defRPr>
+            </a:lvl9pPr>
+          </a:lstStyle>
+          <a:p>
+            <a:pPr marL="0" indent="0">
+              <a:buFont typeface="Arial" panose="020B0604020202020204" pitchFamily="34" charset="0"/>
+              <a:buNone/>
+            </a:pPr>
+            <a:endParaRPr lang="it-IT" sz="2400" dirty="0">
+              <a:latin typeface="Poppins Medium" panose="00000600000000000000" pitchFamily="2" charset="0"/>
+              <a:cs typeface="Poppins Medium" panose="00000600000000000000" pitchFamily="2" charset="0"/>
+            </a:endParaRPr>
+          </a:p>
+          <a:p>
+            <a:pPr marL="0" indent="0">
+              <a:buFont typeface="Arial" panose="020B0604020202020204" pitchFamily="34" charset="0"/>
+              <a:buNone/>
+            </a:pPr>
+            <a:endParaRPr lang="it-IT" sz="2400" dirty="0">
+              <a:latin typeface="Poppins Medium" panose="00000600000000000000" pitchFamily="2" charset="0"/>
+              <a:cs typeface="Poppins Medium" panose="00000600000000000000" pitchFamily="2" charset="0"/>
+            </a:endParaRPr>
+          </a:p>
+          <a:p>
+            <a:pPr marL="0" indent="0">
+              <a:buFont typeface="Arial" panose="020B0604020202020204" pitchFamily="34" charset="0"/>
+              <a:buNone/>
+            </a:pPr>
+            <a:endParaRPr lang="it-IT" sz="2400" dirty="0">
+              <a:latin typeface="Poppins Medium" panose="00000600000000000000" pitchFamily="2" charset="0"/>
+              <a:cs typeface="Poppins Medium" panose="00000600000000000000" pitchFamily="2" charset="0"/>
+            </a:endParaRPr>
+          </a:p>
+          <a:p>
+            <a:pPr marL="0" indent="0">
+              <a:buFont typeface="Arial" panose="020B0604020202020204" pitchFamily="34" charset="0"/>
+              <a:buNone/>
+            </a:pPr>
+            <a:endParaRPr lang="it-IT" dirty="0">
+              <a:solidFill>
+                <a:schemeClr val="accent1">
+                  <a:lumMod val="75000"/>
+                </a:schemeClr>
+              </a:solidFill>
+            </a:endParaRPr>
+          </a:p>
+        </p:txBody>
+      </p:sp>
+      <p:sp>
+        <p:nvSpPr>
+          <p:cNvPr id="10" name="CasellaDiTesto 9">
+            <a:extLst>
+              <a:ext uri="{FF2B5EF4-FFF2-40B4-BE49-F238E27FC236}">
+                <a16:creationId xmlns:a16="http://schemas.microsoft.com/office/drawing/2014/main" id="{A7CDDB9E-ADE5-C99D-F37A-B5643C4976DA}"/>
+              </a:ext>
+            </a:extLst>
+          </p:cNvPr>
+          <p:cNvSpPr txBox="1"/>
+          <p:nvPr/>
+        </p:nvSpPr>
+        <p:spPr>
+          <a:xfrm>
+            <a:off x="735081" y="1925905"/>
+            <a:ext cx="6773281" cy="3539430"/>
+          </a:xfrm>
+          <a:prstGeom prst="rect">
+            <a:avLst/>
+          </a:prstGeom>
+          <a:noFill/>
+        </p:spPr>
+        <p:txBody>
+          <a:bodyPr wrap="square" rtlCol="0">
+            <a:spAutoFit/>
+          </a:bodyPr>
+          <a:lstStyle/>
+          <a:p>
+            <a:pPr marL="457200" indent="-457200">
+              <a:buFont typeface="Arial" panose="020B0604020202020204" pitchFamily="34" charset="0"/>
+              <a:buChar char="•"/>
+            </a:pPr>
+            <a:r>
+              <a:rPr lang="it-IT" sz="2800" dirty="0">
+                <a:latin typeface="Poppins Medium" panose="00000600000000000000" pitchFamily="2" charset="0"/>
+                <a:cs typeface="Poppins Medium" panose="00000600000000000000" pitchFamily="2" charset="0"/>
+              </a:rPr>
+              <a:t>Il progetto utilizza la piattaforma di distribuzione continua </a:t>
+            </a:r>
+            <a:r>
+              <a:rPr lang="it-IT" sz="2800" dirty="0" err="1">
+                <a:latin typeface="Poppins Medium" panose="00000600000000000000" pitchFamily="2" charset="0"/>
+                <a:cs typeface="Poppins Medium" panose="00000600000000000000" pitchFamily="2" charset="0"/>
+              </a:rPr>
+              <a:t>CircleCI</a:t>
+            </a:r>
+            <a:r>
+              <a:rPr lang="it-IT" sz="2800" dirty="0">
+                <a:latin typeface="Poppins Medium" panose="00000600000000000000" pitchFamily="2" charset="0"/>
+                <a:cs typeface="Poppins Medium" panose="00000600000000000000" pitchFamily="2" charset="0"/>
+              </a:rPr>
+              <a:t> (</a:t>
+            </a:r>
+            <a:r>
+              <a:rPr lang="it-IT" sz="2800" u="sng" dirty="0">
+                <a:solidFill>
+                  <a:schemeClr val="accent1">
+                    <a:lumMod val="50000"/>
+                  </a:schemeClr>
+                </a:solidFill>
+                <a:latin typeface="Poppins Medium" panose="00000600000000000000" pitchFamily="2" charset="0"/>
+                <a:cs typeface="Poppins Medium" panose="00000600000000000000" pitchFamily="2" charset="0"/>
+              </a:rPr>
+              <a:t>circleci.com).</a:t>
+            </a:r>
+          </a:p>
+          <a:p>
+            <a:pPr marL="457200" indent="-457200">
+              <a:buFont typeface="Arial" panose="020B0604020202020204" pitchFamily="34" charset="0"/>
+              <a:buChar char="•"/>
+            </a:pPr>
+            <a:r>
+              <a:rPr lang="it-IT" sz="2800" dirty="0">
+                <a:latin typeface="Poppins Medium" panose="00000600000000000000" pitchFamily="2" charset="0"/>
+                <a:cs typeface="Poppins Medium" panose="00000600000000000000" pitchFamily="2" charset="0"/>
+              </a:rPr>
+              <a:t>La pipeline CD di Vue.js si può trovare al link: </a:t>
+            </a:r>
+            <a:r>
+              <a:rPr lang="it-IT" sz="2800" u="sng" dirty="0">
+                <a:solidFill>
+                  <a:schemeClr val="accent1">
+                    <a:lumMod val="50000"/>
+                  </a:schemeClr>
+                </a:solidFill>
+                <a:latin typeface="Poppins Medium" panose="00000600000000000000" pitchFamily="2" charset="0"/>
+                <a:cs typeface="Poppins Medium" panose="00000600000000000000" pitchFamily="2" charset="0"/>
+              </a:rPr>
+              <a:t>app.circleci.com/pipelines/github/vuejs/vue?branch=</a:t>
+            </a:r>
+            <a:r>
+              <a:rPr lang="it-IT" sz="2800" u="sng" dirty="0" err="1">
+                <a:solidFill>
+                  <a:schemeClr val="accent1">
+                    <a:lumMod val="50000"/>
+                  </a:schemeClr>
+                </a:solidFill>
+                <a:latin typeface="Poppins Medium" panose="00000600000000000000" pitchFamily="2" charset="0"/>
+                <a:cs typeface="Poppins Medium" panose="00000600000000000000" pitchFamily="2" charset="0"/>
+              </a:rPr>
+              <a:t>dev</a:t>
+            </a:r>
+            <a:r>
+              <a:rPr lang="it-IT" sz="2800" dirty="0">
+                <a:latin typeface="Poppins Medium" panose="00000600000000000000" pitchFamily="2" charset="0"/>
+                <a:cs typeface="Poppins Medium" panose="00000600000000000000" pitchFamily="2" charset="0"/>
+              </a:rPr>
+              <a:t>.</a:t>
+            </a:r>
+            <a:endParaRPr lang="it-IT" sz="2800" u="sng" dirty="0">
+              <a:solidFill>
+                <a:schemeClr val="accent1">
+                  <a:lumMod val="50000"/>
+                </a:schemeClr>
+              </a:solidFill>
+              <a:latin typeface="Poppins Medium" panose="00000600000000000000" pitchFamily="2" charset="0"/>
+              <a:cs typeface="Poppins Medium" panose="00000600000000000000" pitchFamily="2" charset="0"/>
+            </a:endParaRPr>
+          </a:p>
+          <a:p>
+            <a:pPr marL="285750" indent="-285750">
+              <a:buFont typeface="Arial" panose="020B0604020202020204" pitchFamily="34" charset="0"/>
+              <a:buChar char="•"/>
+            </a:pPr>
+            <a:endParaRPr lang="it-IT" sz="2800" dirty="0">
+              <a:latin typeface="Poppins Medium" panose="00000600000000000000" pitchFamily="2" charset="0"/>
+              <a:cs typeface="Poppins Medium" panose="00000600000000000000" pitchFamily="2" charset="0"/>
+            </a:endParaRPr>
+          </a:p>
+        </p:txBody>
+      </p:sp>
+      <p:pic>
+        <p:nvPicPr>
+          <p:cNvPr id="2050" name="Picture 2" descr="CircleCI - Wikipedia">
+            <a:extLst>
+              <a:ext uri="{FF2B5EF4-FFF2-40B4-BE49-F238E27FC236}">
+                <a16:creationId xmlns:a16="http://schemas.microsoft.com/office/drawing/2014/main" id="{F665BB6B-51B4-2AC3-3CF2-73A9AB671260}"/>
+              </a:ext>
+            </a:extLst>
+          </p:cNvPr>
+          <p:cNvPicPr>
+            <a:picLocks noChangeAspect="1" noChangeArrowheads="1"/>
+          </p:cNvPicPr>
+          <p:nvPr/>
+        </p:nvPicPr>
+        <p:blipFill>
+          <a:blip r:embed="rId3">
+            <a:extLst>
+              <a:ext uri="{28A0092B-C50C-407E-A947-70E740481C1C}">
+                <a14:useLocalDpi xmlns:a14="http://schemas.microsoft.com/office/drawing/2010/main" val="0"/>
+              </a:ext>
+            </a:extLst>
+          </a:blip>
+          <a:srcRect/>
+          <a:stretch>
+            <a:fillRect/>
+          </a:stretch>
+        </p:blipFill>
+        <p:spPr bwMode="auto">
+          <a:xfrm>
+            <a:off x="8655584" y="1312633"/>
+            <a:ext cx="2012828" cy="2033065"/>
+          </a:xfrm>
+          <a:prstGeom prst="rect">
+            <a:avLst/>
+          </a:prstGeom>
+          <a:noFill/>
+          <a:extLst>
+            <a:ext uri="{909E8E84-426E-40DD-AFC4-6F175D3DCCD1}">
+              <a14:hiddenFill xmlns:a14="http://schemas.microsoft.com/office/drawing/2010/main">
+                <a:solidFill>
+                  <a:srgbClr val="FFFFFF"/>
+                </a:solidFill>
+              </a14:hiddenFill>
+            </a:ext>
+          </a:extLst>
+        </p:spPr>
+      </p:pic>
+      <p:pic>
+        <p:nvPicPr>
+          <p:cNvPr id="2052" name="Picture 4" descr="Introduzione al Continuous delivery - iProg">
+            <a:extLst>
+              <a:ext uri="{FF2B5EF4-FFF2-40B4-BE49-F238E27FC236}">
+                <a16:creationId xmlns:a16="http://schemas.microsoft.com/office/drawing/2014/main" id="{8DF413FB-0F0F-70AA-A089-10BA48C014D5}"/>
+              </a:ext>
+            </a:extLst>
+          </p:cNvPr>
+          <p:cNvPicPr>
+            <a:picLocks noChangeAspect="1" noChangeArrowheads="1"/>
+          </p:cNvPicPr>
+          <p:nvPr/>
+        </p:nvPicPr>
+        <p:blipFill>
+          <a:blip r:embed="rId4">
+            <a:extLst>
+              <a:ext uri="{28A0092B-C50C-407E-A947-70E740481C1C}">
+                <a14:useLocalDpi xmlns:a14="http://schemas.microsoft.com/office/drawing/2010/main" val="0"/>
+              </a:ext>
+            </a:extLst>
+          </a:blip>
+          <a:srcRect/>
+          <a:stretch>
+            <a:fillRect/>
+          </a:stretch>
+        </p:blipFill>
+        <p:spPr bwMode="auto">
+          <a:xfrm>
+            <a:off x="8365787" y="3355011"/>
+            <a:ext cx="2594042" cy="2594042"/>
+          </a:xfrm>
+          <a:prstGeom prst="rect">
+            <a:avLst/>
+          </a:prstGeom>
+          <a:noFill/>
+          <a:extLst>
+            <a:ext uri="{909E8E84-426E-40DD-AFC4-6F175D3DCCD1}">
+              <a14:hiddenFill xmlns:a14="http://schemas.microsoft.com/office/drawing/2010/main">
+                <a:solidFill>
+                  <a:srgbClr val="FFFFFF"/>
+                </a:solidFill>
+              </a14:hiddenFill>
+            </a:ext>
+          </a:extLst>
+        </p:spPr>
+      </p:pic>
+    </p:spTree>
+    <p:extLst>
+      <p:ext uri="{BB962C8B-B14F-4D97-AF65-F5344CB8AC3E}">
+        <p14:creationId xmlns:p14="http://schemas.microsoft.com/office/powerpoint/2010/main" val="4047996401"/>
+      </p:ext>
+    </p:extLst>
+  </p:cSld>
+  <p:clrMapOvr>
+    <a:masterClrMapping/>
+  </p:clrMapOvr>
+</p:sld>
+</file>
+
+<file path=ppt/slides/slide31.xml><?xml version="1.0" encoding="utf-8"?>
+<p:sld xmlns:a="http://schemas.openxmlformats.org/drawingml/2006/main" xmlns:r="http://schemas.openxmlformats.org/officeDocument/2006/relationships" xmlns:p="http://schemas.openxmlformats.org/presentationml/2006/main">
+  <p:cSld>
+    <p:spTree>
+      <p:nvGrpSpPr>
+        <p:cNvPr id="1" name=""/>
+        <p:cNvGrpSpPr/>
+        <p:nvPr/>
+      </p:nvGrpSpPr>
+      <p:grpSpPr>
+        <a:xfrm>
+          <a:off x="0" y="0"/>
+          <a:ext cx="0" cy="0"/>
+          <a:chOff x="0" y="0"/>
+          <a:chExt cx="0" cy="0"/>
+        </a:xfrm>
+      </p:grpSpPr>
+      <p:sp>
+        <p:nvSpPr>
+          <p:cNvPr id="25" name="Segnaposto data 24">
+            <a:extLst>
+              <a:ext uri="{FF2B5EF4-FFF2-40B4-BE49-F238E27FC236}">
+                <a16:creationId xmlns:a16="http://schemas.microsoft.com/office/drawing/2014/main" id="{115DF917-AC48-486A-81F6-CF2DBBF5CD89}"/>
+              </a:ext>
+            </a:extLst>
+          </p:cNvPr>
+          <p:cNvSpPr>
+            <a:spLocks noGrp="1"/>
+          </p:cNvSpPr>
+          <p:nvPr>
+            <p:ph type="dt" sz="half" idx="10"/>
+          </p:nvPr>
+        </p:nvSpPr>
+        <p:spPr/>
+        <p:txBody>
+          <a:bodyPr/>
+          <a:lstStyle/>
+          <a:p>
+            <a:r>
+              <a:rPr lang="it-IT" sz="1600">
+                <a:solidFill>
+                  <a:schemeClr val="tx1"/>
+                </a:solidFill>
+                <a:latin typeface="Poppins Medium" panose="00000600000000000000" pitchFamily="2" charset="0"/>
+                <a:cs typeface="Poppins Medium" panose="00000600000000000000" pitchFamily="2" charset="0"/>
+              </a:rPr>
+              <a:t>31 Maggio 2022</a:t>
+            </a:r>
+            <a:endParaRPr lang="de-DE" sz="1600">
+              <a:solidFill>
+                <a:schemeClr val="tx1"/>
+              </a:solidFill>
+              <a:latin typeface="Poppins Medium" panose="00000600000000000000" pitchFamily="2" charset="0"/>
+              <a:cs typeface="Poppins Medium" panose="00000600000000000000" pitchFamily="2" charset="0"/>
+            </a:endParaRPr>
+          </a:p>
+        </p:txBody>
+      </p:sp>
+      <p:sp>
+        <p:nvSpPr>
+          <p:cNvPr id="27" name="Segnaposto numero diapositiva 26">
+            <a:extLst>
+              <a:ext uri="{FF2B5EF4-FFF2-40B4-BE49-F238E27FC236}">
+                <a16:creationId xmlns:a16="http://schemas.microsoft.com/office/drawing/2014/main" id="{F9C2EE25-215B-477C-AC6E-D2639B7A24B6}"/>
+              </a:ext>
+            </a:extLst>
+          </p:cNvPr>
+          <p:cNvSpPr>
+            <a:spLocks noGrp="1"/>
+          </p:cNvSpPr>
+          <p:nvPr>
+            <p:ph type="sldNum" sz="quarter" idx="12"/>
+          </p:nvPr>
+        </p:nvSpPr>
+        <p:spPr/>
+        <p:txBody>
+          <a:bodyPr/>
+          <a:lstStyle/>
+          <a:p>
+            <a:fld id="{66CD45B7-DFE2-4393-8D37-380FC36BF3AA}" type="slidenum">
+              <a:rPr lang="de-DE" sz="1600" smtClean="0">
+                <a:solidFill>
+                  <a:schemeClr val="tx1"/>
+                </a:solidFill>
+                <a:latin typeface="Poppins Medium" panose="00000600000000000000" pitchFamily="2" charset="0"/>
+                <a:cs typeface="Poppins Medium" panose="00000600000000000000" pitchFamily="2" charset="0"/>
+              </a:rPr>
+              <a:t>31</a:t>
+            </a:fld>
+            <a:r>
+              <a:rPr lang="de-DE" sz="1600" dirty="0">
+                <a:solidFill>
+                  <a:schemeClr val="tx1"/>
+                </a:solidFill>
+                <a:latin typeface="Poppins Medium" panose="00000600000000000000" pitchFamily="2" charset="0"/>
+                <a:cs typeface="Poppins Medium" panose="00000600000000000000" pitchFamily="2" charset="0"/>
+              </a:rPr>
+              <a:t>/16</a:t>
+            </a:r>
+          </a:p>
+        </p:txBody>
+      </p:sp>
+      <p:sp>
+        <p:nvSpPr>
+          <p:cNvPr id="8" name="Segnaposto contenuto 6">
+            <a:extLst>
+              <a:ext uri="{FF2B5EF4-FFF2-40B4-BE49-F238E27FC236}">
+                <a16:creationId xmlns:a16="http://schemas.microsoft.com/office/drawing/2014/main" id="{F832EED3-9182-E3BD-D2D5-1723AFD8A0BD}"/>
+              </a:ext>
+            </a:extLst>
+          </p:cNvPr>
+          <p:cNvSpPr txBox="1">
+            <a:spLocks/>
+          </p:cNvSpPr>
+          <p:nvPr/>
+        </p:nvSpPr>
+        <p:spPr>
+          <a:xfrm>
+            <a:off x="834656" y="2005012"/>
+            <a:ext cx="10515600" cy="4351338"/>
+          </a:xfrm>
+          <a:prstGeom prst="rect">
+            <a:avLst/>
+          </a:prstGeom>
+        </p:spPr>
+        <p:txBody>
+          <a:bodyPr vert="horz" lIns="91440" tIns="45720" rIns="91440" bIns="45720" rtlCol="0">
+            <a:normAutofit/>
+          </a:bodyPr>
+          <a:lstStyle>
+            <a:lvl1pPr marL="228600" indent="-228600" algn="l" defTabSz="914400" rtl="0" eaLnBrk="1" latinLnBrk="0" hangingPunct="1">
+              <a:lnSpc>
+                <a:spcPct val="90000"/>
+              </a:lnSpc>
+              <a:spcBef>
+                <a:spcPts val="1000"/>
+              </a:spcBef>
+              <a:buFont typeface="Arial" panose="020B0604020202020204" pitchFamily="34" charset="0"/>
+              <a:buChar char="•"/>
+              <a:defRPr sz="2800" kern="1200">
+                <a:solidFill>
+                  <a:schemeClr val="tx1"/>
+                </a:solidFill>
+                <a:latin typeface="+mn-lt"/>
+                <a:ea typeface="+mn-ea"/>
+                <a:cs typeface="+mn-cs"/>
+              </a:defRPr>
+            </a:lvl1pPr>
+            <a:lvl2pPr marL="685800" indent="-228600" algn="l" defTabSz="914400" rtl="0" eaLnBrk="1" latinLnBrk="0" hangingPunct="1">
+              <a:lnSpc>
+                <a:spcPct val="90000"/>
+              </a:lnSpc>
+              <a:spcBef>
+                <a:spcPts val="500"/>
+              </a:spcBef>
+              <a:buFont typeface="Arial" panose="020B0604020202020204" pitchFamily="34" charset="0"/>
+              <a:buChar char="•"/>
+              <a:defRPr sz="2400" kern="1200">
+                <a:solidFill>
+                  <a:schemeClr val="tx1"/>
+                </a:solidFill>
+                <a:latin typeface="+mn-lt"/>
+                <a:ea typeface="+mn-ea"/>
+                <a:cs typeface="+mn-cs"/>
+              </a:defRPr>
+            </a:lvl2pPr>
+            <a:lvl3pPr marL="1143000" indent="-228600" algn="l" defTabSz="914400" rtl="0" eaLnBrk="1" latinLnBrk="0" hangingPunct="1">
+              <a:lnSpc>
+                <a:spcPct val="90000"/>
+              </a:lnSpc>
+              <a:spcBef>
+                <a:spcPts val="500"/>
+              </a:spcBef>
+              <a:buFont typeface="Arial" panose="020B0604020202020204" pitchFamily="34" charset="0"/>
+              <a:buChar char="•"/>
+              <a:defRPr sz="2000" kern="1200">
+                <a:solidFill>
+                  <a:schemeClr val="tx1"/>
+                </a:solidFill>
+                <a:latin typeface="+mn-lt"/>
+                <a:ea typeface="+mn-ea"/>
+                <a:cs typeface="+mn-cs"/>
+              </a:defRPr>
+            </a:lvl3pPr>
+            <a:lvl4pPr marL="1600200" indent="-228600" algn="l" defTabSz="914400" rtl="0" eaLnBrk="1" latinLnBrk="0" hangingPunct="1">
+              <a:lnSpc>
+                <a:spcPct val="90000"/>
+              </a:lnSpc>
+              <a:spcBef>
+                <a:spcPts val="500"/>
+              </a:spcBef>
+              <a:buFont typeface="Arial" panose="020B0604020202020204" pitchFamily="34" charset="0"/>
+              <a:buChar char="•"/>
+              <a:defRPr sz="1800" kern="1200">
+                <a:solidFill>
+                  <a:schemeClr val="tx1"/>
+                </a:solidFill>
+                <a:latin typeface="+mn-lt"/>
+                <a:ea typeface="+mn-ea"/>
+                <a:cs typeface="+mn-cs"/>
+              </a:defRPr>
+            </a:lvl4pPr>
+            <a:lvl5pPr marL="2057400" indent="-228600" algn="l" defTabSz="914400" rtl="0" eaLnBrk="1" latinLnBrk="0" hangingPunct="1">
+              <a:lnSpc>
+                <a:spcPct val="90000"/>
+              </a:lnSpc>
+              <a:spcBef>
+                <a:spcPts val="500"/>
+              </a:spcBef>
+              <a:buFont typeface="Arial" panose="020B0604020202020204" pitchFamily="34" charset="0"/>
+              <a:buChar char="•"/>
+              <a:defRPr sz="1800" kern="1200">
+                <a:solidFill>
+                  <a:schemeClr val="tx1"/>
+                </a:solidFill>
+                <a:latin typeface="+mn-lt"/>
+                <a:ea typeface="+mn-ea"/>
+                <a:cs typeface="+mn-cs"/>
+              </a:defRPr>
+            </a:lvl5pPr>
+            <a:lvl6pPr marL="2514600" indent="-228600" algn="l" defTabSz="914400" rtl="0" eaLnBrk="1" latinLnBrk="0" hangingPunct="1">
+              <a:lnSpc>
+                <a:spcPct val="90000"/>
+              </a:lnSpc>
+              <a:spcBef>
+                <a:spcPts val="500"/>
+              </a:spcBef>
+              <a:buFont typeface="Arial" panose="020B0604020202020204" pitchFamily="34" charset="0"/>
+              <a:buChar char="•"/>
+              <a:defRPr sz="1800" kern="1200">
+                <a:solidFill>
+                  <a:schemeClr val="tx1"/>
+                </a:solidFill>
+                <a:latin typeface="+mn-lt"/>
+                <a:ea typeface="+mn-ea"/>
+                <a:cs typeface="+mn-cs"/>
+              </a:defRPr>
+            </a:lvl6pPr>
+            <a:lvl7pPr marL="2971800" indent="-228600" algn="l" defTabSz="914400" rtl="0" eaLnBrk="1" latinLnBrk="0" hangingPunct="1">
+              <a:lnSpc>
+                <a:spcPct val="90000"/>
+              </a:lnSpc>
+              <a:spcBef>
+                <a:spcPts val="500"/>
+              </a:spcBef>
+              <a:buFont typeface="Arial" panose="020B0604020202020204" pitchFamily="34" charset="0"/>
+              <a:buChar char="•"/>
+              <a:defRPr sz="1800" kern="1200">
+                <a:solidFill>
+                  <a:schemeClr val="tx1"/>
+                </a:solidFill>
+                <a:latin typeface="+mn-lt"/>
+                <a:ea typeface="+mn-ea"/>
+                <a:cs typeface="+mn-cs"/>
+              </a:defRPr>
+            </a:lvl7pPr>
+            <a:lvl8pPr marL="3429000" indent="-228600" algn="l" defTabSz="914400" rtl="0" eaLnBrk="1" latinLnBrk="0" hangingPunct="1">
+              <a:lnSpc>
+                <a:spcPct val="90000"/>
+              </a:lnSpc>
+              <a:spcBef>
+                <a:spcPts val="500"/>
+              </a:spcBef>
+              <a:buFont typeface="Arial" panose="020B0604020202020204" pitchFamily="34" charset="0"/>
+              <a:buChar char="•"/>
+              <a:defRPr sz="1800" kern="1200">
+                <a:solidFill>
+                  <a:schemeClr val="tx1"/>
+                </a:solidFill>
+                <a:latin typeface="+mn-lt"/>
+                <a:ea typeface="+mn-ea"/>
+                <a:cs typeface="+mn-cs"/>
+              </a:defRPr>
+            </a:lvl8pPr>
+            <a:lvl9pPr marL="3886200" indent="-228600" algn="l" defTabSz="914400" rtl="0" eaLnBrk="1" latinLnBrk="0" hangingPunct="1">
+              <a:lnSpc>
+                <a:spcPct val="90000"/>
+              </a:lnSpc>
+              <a:spcBef>
+                <a:spcPts val="500"/>
+              </a:spcBef>
+              <a:buFont typeface="Arial" panose="020B0604020202020204" pitchFamily="34" charset="0"/>
+              <a:buChar char="•"/>
+              <a:defRPr sz="1800" kern="1200">
+                <a:solidFill>
+                  <a:schemeClr val="tx1"/>
+                </a:solidFill>
+                <a:latin typeface="+mn-lt"/>
+                <a:ea typeface="+mn-ea"/>
+                <a:cs typeface="+mn-cs"/>
+              </a:defRPr>
+            </a:lvl9pPr>
+          </a:lstStyle>
+          <a:p>
+            <a:pPr marL="0" indent="0">
+              <a:buFont typeface="Arial" panose="020B0604020202020204" pitchFamily="34" charset="0"/>
+              <a:buNone/>
+            </a:pPr>
+            <a:endParaRPr lang="it-IT" sz="2400" dirty="0">
+              <a:latin typeface="Poppins Medium" panose="00000600000000000000" pitchFamily="2" charset="0"/>
+              <a:cs typeface="Poppins Medium" panose="00000600000000000000" pitchFamily="2" charset="0"/>
+            </a:endParaRPr>
+          </a:p>
+          <a:p>
+            <a:pPr marL="0" indent="0">
+              <a:buFont typeface="Arial" panose="020B0604020202020204" pitchFamily="34" charset="0"/>
+              <a:buNone/>
+            </a:pPr>
+            <a:endParaRPr lang="it-IT" sz="2400" dirty="0">
+              <a:latin typeface="Poppins Medium" panose="00000600000000000000" pitchFamily="2" charset="0"/>
+              <a:cs typeface="Poppins Medium" panose="00000600000000000000" pitchFamily="2" charset="0"/>
+            </a:endParaRPr>
+          </a:p>
+          <a:p>
+            <a:pPr marL="0" indent="0">
+              <a:buFont typeface="Arial" panose="020B0604020202020204" pitchFamily="34" charset="0"/>
+              <a:buNone/>
+            </a:pPr>
+            <a:endParaRPr lang="it-IT" sz="2400" dirty="0">
+              <a:latin typeface="Poppins Medium" panose="00000600000000000000" pitchFamily="2" charset="0"/>
+              <a:cs typeface="Poppins Medium" panose="00000600000000000000" pitchFamily="2" charset="0"/>
+            </a:endParaRPr>
+          </a:p>
+          <a:p>
+            <a:pPr marL="0" indent="0">
+              <a:buFont typeface="Arial" panose="020B0604020202020204" pitchFamily="34" charset="0"/>
+              <a:buNone/>
+            </a:pPr>
+            <a:endParaRPr lang="it-IT" dirty="0">
+              <a:solidFill>
+                <a:schemeClr val="accent1">
+                  <a:lumMod val="75000"/>
+                </a:schemeClr>
+              </a:solidFill>
+            </a:endParaRPr>
+          </a:p>
+        </p:txBody>
+      </p:sp>
+      <p:pic>
+        <p:nvPicPr>
+          <p:cNvPr id="3074" name="Picture 2" descr="Regression Testing Guide: Definition, Process, Tools, Test Cases">
+            <a:extLst>
+              <a:ext uri="{FF2B5EF4-FFF2-40B4-BE49-F238E27FC236}">
+                <a16:creationId xmlns:a16="http://schemas.microsoft.com/office/drawing/2014/main" id="{400AF077-A36B-CEA3-B397-7122A593A7E6}"/>
+              </a:ext>
+            </a:extLst>
+          </p:cNvPr>
+          <p:cNvPicPr>
+            <a:picLocks noChangeAspect="1" noChangeArrowheads="1"/>
+          </p:cNvPicPr>
+          <p:nvPr/>
+        </p:nvPicPr>
+        <p:blipFill rotWithShape="1">
+          <a:blip r:embed="rId3">
+            <a:extLst>
+              <a:ext uri="{28A0092B-C50C-407E-A947-70E740481C1C}">
+                <a14:useLocalDpi xmlns:a14="http://schemas.microsoft.com/office/drawing/2010/main" val="0"/>
+              </a:ext>
+            </a:extLst>
+          </a:blip>
+          <a:srcRect l="42128"/>
+          <a:stretch/>
+        </p:blipFill>
+        <p:spPr bwMode="auto">
+          <a:xfrm>
+            <a:off x="7319740" y="793516"/>
+            <a:ext cx="4409872" cy="4000500"/>
+          </a:xfrm>
+          <a:prstGeom prst="rect">
+            <a:avLst/>
+          </a:prstGeom>
+          <a:noFill/>
+          <a:extLst>
+            <a:ext uri="{909E8E84-426E-40DD-AFC4-6F175D3DCCD1}">
+              <a14:hiddenFill xmlns:a14="http://schemas.microsoft.com/office/drawing/2010/main">
+                <a:solidFill>
+                  <a:srgbClr val="FFFFFF"/>
+                </a:solidFill>
+              </a14:hiddenFill>
+            </a:ext>
+          </a:extLst>
+        </p:spPr>
+      </p:pic>
+      <p:sp>
+        <p:nvSpPr>
+          <p:cNvPr id="11" name="Rettangolo 10">
+            <a:extLst>
+              <a:ext uri="{FF2B5EF4-FFF2-40B4-BE49-F238E27FC236}">
+                <a16:creationId xmlns:a16="http://schemas.microsoft.com/office/drawing/2014/main" id="{A23FDF35-A7D5-3A9C-5DE8-FC43DBA885EC}"/>
+              </a:ext>
+            </a:extLst>
+          </p:cNvPr>
+          <p:cNvSpPr/>
+          <p:nvPr/>
+        </p:nvSpPr>
+        <p:spPr>
+          <a:xfrm>
+            <a:off x="2518143" y="629924"/>
+            <a:ext cx="12184913" cy="1034891"/>
+          </a:xfrm>
+          <a:prstGeom prst="rect">
+            <a:avLst/>
+          </a:prstGeom>
+          <a:solidFill>
+            <a:schemeClr val="bg1"/>
+          </a:solidFill>
+          <a:ln>
+            <a:noFill/>
+          </a:ln>
+        </p:spPr>
+        <p:style>
+          <a:lnRef idx="2">
+            <a:schemeClr val="accent3">
+              <a:shade val="50000"/>
+            </a:schemeClr>
+          </a:lnRef>
+          <a:fillRef idx="1">
+            <a:schemeClr val="accent3"/>
+          </a:fillRef>
+          <a:effectRef idx="0">
+            <a:schemeClr val="accent3"/>
+          </a:effectRef>
+          <a:fontRef idx="minor">
+            <a:schemeClr val="lt1"/>
+          </a:fontRef>
+        </p:style>
+        <p:txBody>
+          <a:bodyPr rtlCol="0" anchor="ctr"/>
+          <a:lstStyle/>
+          <a:p>
+            <a:pPr algn="ctr"/>
+            <a:endParaRPr lang="it-IT"/>
+          </a:p>
+        </p:txBody>
+      </p:sp>
+      <p:sp>
+        <p:nvSpPr>
+          <p:cNvPr id="14" name="Rettangolo 13">
+            <a:extLst>
+              <a:ext uri="{FF2B5EF4-FFF2-40B4-BE49-F238E27FC236}">
+                <a16:creationId xmlns:a16="http://schemas.microsoft.com/office/drawing/2014/main" id="{370D8EC0-1714-CB85-B106-D1B2439C9423}"/>
+              </a:ext>
+            </a:extLst>
+          </p:cNvPr>
+          <p:cNvSpPr/>
+          <p:nvPr/>
+        </p:nvSpPr>
+        <p:spPr>
+          <a:xfrm rot="5190609">
+            <a:off x="5826833" y="6911730"/>
+            <a:ext cx="12184913" cy="1034891"/>
+          </a:xfrm>
+          <a:prstGeom prst="rect">
+            <a:avLst/>
+          </a:prstGeom>
+          <a:solidFill>
+            <a:schemeClr val="bg1"/>
+          </a:solidFill>
+          <a:ln>
+            <a:noFill/>
+          </a:ln>
+        </p:spPr>
+        <p:style>
+          <a:lnRef idx="2">
+            <a:schemeClr val="accent3">
+              <a:shade val="50000"/>
+            </a:schemeClr>
+          </a:lnRef>
+          <a:fillRef idx="1">
+            <a:schemeClr val="accent3"/>
+          </a:fillRef>
+          <a:effectRef idx="0">
+            <a:schemeClr val="accent3"/>
+          </a:effectRef>
+          <a:fontRef idx="minor">
+            <a:schemeClr val="lt1"/>
+          </a:fontRef>
+        </p:style>
+        <p:txBody>
+          <a:bodyPr rtlCol="0" anchor="ctr"/>
+          <a:lstStyle/>
+          <a:p>
+            <a:pPr algn="ctr"/>
+            <a:endParaRPr lang="it-IT"/>
+          </a:p>
+        </p:txBody>
+      </p:sp>
+      <p:sp>
+        <p:nvSpPr>
+          <p:cNvPr id="15" name="Rettangolo 14">
+            <a:extLst>
+              <a:ext uri="{FF2B5EF4-FFF2-40B4-BE49-F238E27FC236}">
+                <a16:creationId xmlns:a16="http://schemas.microsoft.com/office/drawing/2014/main" id="{C0A73AD9-E9CE-4E96-EE70-EA806EB1585D}"/>
+              </a:ext>
+            </a:extLst>
+          </p:cNvPr>
+          <p:cNvSpPr/>
+          <p:nvPr/>
+        </p:nvSpPr>
+        <p:spPr>
+          <a:xfrm>
+            <a:off x="2005820" y="5186848"/>
+            <a:ext cx="12184913" cy="1034891"/>
+          </a:xfrm>
+          <a:prstGeom prst="rect">
+            <a:avLst/>
+          </a:prstGeom>
+          <a:solidFill>
+            <a:schemeClr val="bg1"/>
+          </a:solidFill>
+          <a:ln>
+            <a:noFill/>
+          </a:ln>
+        </p:spPr>
+        <p:style>
+          <a:lnRef idx="2">
+            <a:schemeClr val="accent3">
+              <a:shade val="50000"/>
+            </a:schemeClr>
+          </a:lnRef>
+          <a:fillRef idx="1">
+            <a:schemeClr val="accent3"/>
+          </a:fillRef>
+          <a:effectRef idx="0">
+            <a:schemeClr val="accent3"/>
+          </a:effectRef>
+          <a:fontRef idx="minor">
+            <a:schemeClr val="lt1"/>
+          </a:fontRef>
+        </p:style>
+        <p:txBody>
+          <a:bodyPr rtlCol="0" anchor="ctr"/>
+          <a:lstStyle/>
+          <a:p>
+            <a:pPr algn="ctr"/>
+            <a:endParaRPr lang="it-IT"/>
+          </a:p>
+        </p:txBody>
+      </p:sp>
+      <p:pic>
+        <p:nvPicPr>
+          <p:cNvPr id="3" name="Immagine 2">
+            <a:extLst>
+              <a:ext uri="{FF2B5EF4-FFF2-40B4-BE49-F238E27FC236}">
+                <a16:creationId xmlns:a16="http://schemas.microsoft.com/office/drawing/2014/main" id="{92F7FBD3-054F-3D0B-7BDA-57967C9CB02A}"/>
+              </a:ext>
+            </a:extLst>
+          </p:cNvPr>
+          <p:cNvPicPr>
+            <a:picLocks noChangeAspect="1"/>
+          </p:cNvPicPr>
+          <p:nvPr/>
+        </p:nvPicPr>
+        <p:blipFill>
+          <a:blip r:embed="rId4">
+            <a:extLst>
+              <a:ext uri="{28A0092B-C50C-407E-A947-70E740481C1C}">
+                <a14:useLocalDpi xmlns:a14="http://schemas.microsoft.com/office/drawing/2010/main" val="0"/>
+              </a:ext>
+            </a:extLst>
+          </a:blip>
+          <a:stretch>
+            <a:fillRect/>
+          </a:stretch>
+        </p:blipFill>
+        <p:spPr>
+          <a:xfrm>
+            <a:off x="684862" y="4530495"/>
+            <a:ext cx="10815188" cy="1178096"/>
+          </a:xfrm>
+          <a:prstGeom prst="rect">
+            <a:avLst/>
+          </a:prstGeom>
+        </p:spPr>
+      </p:pic>
+      <p:sp>
+        <p:nvSpPr>
+          <p:cNvPr id="10" name="CasellaDiTesto 9">
+            <a:extLst>
+              <a:ext uri="{FF2B5EF4-FFF2-40B4-BE49-F238E27FC236}">
+                <a16:creationId xmlns:a16="http://schemas.microsoft.com/office/drawing/2014/main" id="{A7CDDB9E-ADE5-C99D-F37A-B5643C4976DA}"/>
+              </a:ext>
+            </a:extLst>
+          </p:cNvPr>
+          <p:cNvSpPr txBox="1"/>
+          <p:nvPr/>
+        </p:nvSpPr>
+        <p:spPr>
+          <a:xfrm>
+            <a:off x="684862" y="1656423"/>
+            <a:ext cx="6366110" cy="2677656"/>
+          </a:xfrm>
+          <a:prstGeom prst="rect">
+            <a:avLst/>
+          </a:prstGeom>
+          <a:noFill/>
+        </p:spPr>
+        <p:txBody>
+          <a:bodyPr wrap="square" rtlCol="0">
+            <a:spAutoFit/>
+          </a:bodyPr>
+          <a:lstStyle/>
+          <a:p>
+            <a:pPr marL="285750" indent="-285750">
+              <a:buFont typeface="Arial" panose="020B0604020202020204" pitchFamily="34" charset="0"/>
+              <a:buChar char="•"/>
+            </a:pPr>
+            <a:r>
+              <a:rPr lang="it-IT" sz="2800" dirty="0" err="1">
+                <a:latin typeface="Poppins" panose="00000800000000000000" pitchFamily="2" charset="0"/>
+                <a:cs typeface="Poppins" panose="00000800000000000000" pitchFamily="2" charset="0"/>
+              </a:rPr>
+              <a:t>weekly_regression_test</a:t>
+            </a:r>
+            <a:r>
+              <a:rPr lang="it-IT" sz="2800" dirty="0">
+                <a:latin typeface="Poppins Medium" panose="00000600000000000000" pitchFamily="2" charset="0"/>
+                <a:cs typeface="Poppins Medium" panose="00000600000000000000" pitchFamily="2" charset="0"/>
+              </a:rPr>
+              <a:t>:   utilizzato per eseguire i test di regressione settimanalmente;</a:t>
+            </a:r>
+          </a:p>
+          <a:p>
+            <a:pPr marL="285750" indent="-285750">
+              <a:buFont typeface="Arial" panose="020B0604020202020204" pitchFamily="34" charset="0"/>
+              <a:buChar char="•"/>
+            </a:pPr>
+            <a:r>
+              <a:rPr lang="it-IT" sz="2800" dirty="0" err="1">
+                <a:latin typeface="Poppins" panose="00000800000000000000" pitchFamily="2" charset="0"/>
+                <a:cs typeface="Poppins" panose="00000800000000000000" pitchFamily="2" charset="0"/>
+              </a:rPr>
+              <a:t>install</a:t>
+            </a:r>
+            <a:r>
+              <a:rPr lang="it-IT" sz="2800" dirty="0">
+                <a:latin typeface="Poppins" panose="00000800000000000000" pitchFamily="2" charset="0"/>
+                <a:cs typeface="Poppins" panose="00000800000000000000" pitchFamily="2" charset="0"/>
+              </a:rPr>
+              <a:t>-and-</a:t>
+            </a:r>
+            <a:r>
+              <a:rPr lang="it-IT" sz="2800" dirty="0" err="1">
+                <a:latin typeface="Poppins" panose="00000800000000000000" pitchFamily="2" charset="0"/>
+                <a:cs typeface="Poppins" panose="00000800000000000000" pitchFamily="2" charset="0"/>
+              </a:rPr>
+              <a:t>parallel</a:t>
+            </a:r>
+            <a:r>
+              <a:rPr lang="it-IT" sz="2800" dirty="0">
+                <a:latin typeface="Poppins" panose="00000800000000000000" pitchFamily="2" charset="0"/>
+                <a:cs typeface="Poppins" panose="00000800000000000000" pitchFamily="2" charset="0"/>
+              </a:rPr>
+              <a:t>-test</a:t>
+            </a:r>
+            <a:r>
+              <a:rPr lang="it-IT" sz="2800" dirty="0">
+                <a:latin typeface="Poppins Medium" panose="00000600000000000000" pitchFamily="2" charset="0"/>
+                <a:cs typeface="Poppins Medium" panose="00000600000000000000" pitchFamily="2" charset="0"/>
+              </a:rPr>
+              <a:t>: esecuzione dei test in parallelo.</a:t>
+            </a:r>
+          </a:p>
+          <a:p>
+            <a:endParaRPr lang="it-IT" sz="2800" dirty="0">
+              <a:latin typeface="Poppins Medium" panose="00000600000000000000" pitchFamily="2" charset="0"/>
+              <a:cs typeface="Poppins Medium" panose="00000600000000000000" pitchFamily="2" charset="0"/>
+            </a:endParaRPr>
+          </a:p>
+        </p:txBody>
+      </p:sp>
+      <p:sp>
+        <p:nvSpPr>
+          <p:cNvPr id="12" name="Rettangolo 11">
+            <a:extLst>
+              <a:ext uri="{FF2B5EF4-FFF2-40B4-BE49-F238E27FC236}">
+                <a16:creationId xmlns:a16="http://schemas.microsoft.com/office/drawing/2014/main" id="{F0FAD030-2623-A89C-4FA1-55CE81C0AE08}"/>
+              </a:ext>
+            </a:extLst>
+          </p:cNvPr>
+          <p:cNvSpPr/>
+          <p:nvPr/>
+        </p:nvSpPr>
+        <p:spPr>
+          <a:xfrm>
+            <a:off x="0" y="0"/>
+            <a:ext cx="12192000" cy="1034891"/>
+          </a:xfrm>
+          <a:prstGeom prst="rect">
+            <a:avLst/>
+          </a:prstGeom>
+          <a:solidFill>
+            <a:srgbClr val="002060"/>
+          </a:solidFill>
+          <a:ln>
+            <a:noFill/>
+          </a:ln>
+        </p:spPr>
+        <p:style>
+          <a:lnRef idx="2">
+            <a:schemeClr val="accent3">
+              <a:shade val="50000"/>
+            </a:schemeClr>
+          </a:lnRef>
+          <a:fillRef idx="1">
+            <a:schemeClr val="accent3"/>
+          </a:fillRef>
+          <a:effectRef idx="0">
+            <a:schemeClr val="accent3"/>
+          </a:effectRef>
+          <a:fontRef idx="minor">
+            <a:schemeClr val="lt1"/>
+          </a:fontRef>
+        </p:style>
+        <p:txBody>
+          <a:bodyPr rtlCol="0" anchor="ctr"/>
+          <a:lstStyle/>
+          <a:p>
+            <a:pPr algn="ctr"/>
+            <a:endParaRPr lang="it-IT"/>
+          </a:p>
+        </p:txBody>
+      </p:sp>
+      <p:sp>
+        <p:nvSpPr>
+          <p:cNvPr id="13" name="Titolo 1">
+            <a:extLst>
+              <a:ext uri="{FF2B5EF4-FFF2-40B4-BE49-F238E27FC236}">
+                <a16:creationId xmlns:a16="http://schemas.microsoft.com/office/drawing/2014/main" id="{A0F14F07-00BE-A130-44A5-463A5F98673C}"/>
+              </a:ext>
+            </a:extLst>
+          </p:cNvPr>
+          <p:cNvSpPr>
+            <a:spLocks noGrp="1"/>
+          </p:cNvSpPr>
+          <p:nvPr>
+            <p:ph type="title"/>
+          </p:nvPr>
+        </p:nvSpPr>
+        <p:spPr>
+          <a:xfrm>
+            <a:off x="272535" y="163591"/>
+            <a:ext cx="10176803" cy="707708"/>
+          </a:xfrm>
+        </p:spPr>
+        <p:txBody>
+          <a:bodyPr anchor="b">
+            <a:normAutofit/>
+          </a:bodyPr>
+          <a:lstStyle/>
+          <a:p>
+            <a:r>
+              <a:rPr lang="it-IT" sz="4000" b="1" dirty="0">
+                <a:solidFill>
+                  <a:schemeClr val="bg1"/>
+                </a:solidFill>
+                <a:latin typeface="Poppins"/>
+                <a:cs typeface="Poppins"/>
+              </a:rPr>
+              <a:t>CD-Pipelines</a:t>
+            </a:r>
+          </a:p>
+        </p:txBody>
+      </p:sp>
+    </p:spTree>
+    <p:extLst>
+      <p:ext uri="{BB962C8B-B14F-4D97-AF65-F5344CB8AC3E}">
+        <p14:creationId xmlns:p14="http://schemas.microsoft.com/office/powerpoint/2010/main" val="3055642496"/>
+      </p:ext>
+    </p:extLst>
+  </p:cSld>
+  <p:clrMapOvr>
+    <a:masterClrMapping/>
+  </p:clrMapOvr>
+</p:sld>
+</file>
+
+<file path=ppt/slides/slide32.xml><?xml version="1.0" encoding="utf-8"?>
 <p:sld xmlns:a="http://schemas.openxmlformats.org/drawingml/2006/main" xmlns:r="http://schemas.openxmlformats.org/officeDocument/2006/relationships" xmlns:p="http://schemas.openxmlformats.org/presentationml/2006/main">
   <p:cSld>
     <p:spTree>
@@ -18150,7 +21050,7 @@
                 <a:cs typeface="Poppins Medium" panose="00000600000000000000" pitchFamily="2" charset="0"/>
               </a:rPr>
               <a:pPr/>
-              <a:t>29</a:t>
+              <a:t>32</a:t>
             </a:fld>
             <a:r>
               <a:rPr lang="de-DE" sz="1600">
@@ -18224,7 +21124,7 @@
 </p:sld>
 </file>
 
-<file path=ppt/slides/slide3.xml><?xml version="1.0" encoding="utf-8"?>
+<file path=ppt/slides/slide33.xml><?xml version="1.0" encoding="utf-8"?>
 <p:sld xmlns:a="http://schemas.openxmlformats.org/drawingml/2006/main" xmlns:r="http://schemas.openxmlformats.org/officeDocument/2006/relationships" xmlns:p="http://schemas.openxmlformats.org/presentationml/2006/main">
   <p:cSld>
     <p:spTree>
@@ -18243,93 +21143,6 @@
       </p:grpSpPr>
       <p:sp>
         <p:nvSpPr>
-          <p:cNvPr id="7" name="Segnaposto contenuto 6">
-            <a:extLst>
-              <a:ext uri="{FF2B5EF4-FFF2-40B4-BE49-F238E27FC236}">
-                <a16:creationId xmlns:a16="http://schemas.microsoft.com/office/drawing/2014/main" id="{02FC6CA0-25CF-64B7-760B-56A8388FA257}"/>
-              </a:ext>
-            </a:extLst>
-          </p:cNvPr>
-          <p:cNvSpPr>
-            <a:spLocks noGrp="1"/>
-          </p:cNvSpPr>
-          <p:nvPr>
-            <p:ph idx="1"/>
-          </p:nvPr>
-        </p:nvSpPr>
-        <p:spPr/>
-        <p:txBody>
-          <a:bodyPr/>
-          <a:lstStyle/>
-          <a:p>
-            <a:pPr marL="0" indent="0">
-              <a:buNone/>
-            </a:pPr>
-            <a:r>
-              <a:rPr lang="it-IT" sz="2400" dirty="0">
-                <a:latin typeface="Poppins Medium" panose="00000600000000000000" pitchFamily="2" charset="0"/>
-                <a:cs typeface="Poppins Medium" panose="00000600000000000000" pitchFamily="2" charset="0"/>
-              </a:rPr>
-              <a:t>Per aprire una </a:t>
-            </a:r>
-            <a:r>
-              <a:rPr lang="it-IT" sz="2400" dirty="0" err="1">
-                <a:latin typeface="Poppins Medium" panose="00000600000000000000" pitchFamily="2" charset="0"/>
-                <a:cs typeface="Poppins Medium" panose="00000600000000000000" pitchFamily="2" charset="0"/>
-              </a:rPr>
-              <a:t>issue</a:t>
-            </a:r>
-            <a:r>
-              <a:rPr lang="it-IT" sz="2400" dirty="0">
-                <a:latin typeface="Poppins Medium" panose="00000600000000000000" pitchFamily="2" charset="0"/>
-                <a:cs typeface="Poppins Medium" panose="00000600000000000000" pitchFamily="2" charset="0"/>
-              </a:rPr>
-              <a:t> si deve usare:</a:t>
-            </a:r>
-          </a:p>
-          <a:p>
-            <a:pPr marL="0" indent="0">
-              <a:buNone/>
-            </a:pPr>
-            <a:r>
-              <a:rPr lang="it-IT" sz="2400" dirty="0">
-                <a:solidFill>
-                  <a:schemeClr val="accent1">
-                    <a:lumMod val="75000"/>
-                  </a:schemeClr>
-                </a:solidFill>
-                <a:latin typeface="Poppins" panose="00000500000000000000" pitchFamily="2" charset="0"/>
-                <a:cs typeface="Poppins" panose="00000500000000000000" pitchFamily="2" charset="0"/>
-                <a:hlinkClick r:id="rId3"/>
-              </a:rPr>
-              <a:t>https://new-issue.vuejs.org/?repo=vuejs/core#</a:t>
-            </a:r>
-            <a:endParaRPr lang="it-IT" sz="2400" dirty="0">
-              <a:solidFill>
-                <a:schemeClr val="accent1">
-                  <a:lumMod val="75000"/>
-                </a:schemeClr>
-              </a:solidFill>
-              <a:latin typeface="Poppins" panose="00000500000000000000" pitchFamily="2" charset="0"/>
-              <a:cs typeface="Poppins" panose="00000500000000000000" pitchFamily="2" charset="0"/>
-            </a:endParaRPr>
-          </a:p>
-          <a:p>
-            <a:pPr marL="0" indent="0">
-              <a:buNone/>
-            </a:pPr>
-            <a:endParaRPr lang="it-IT" dirty="0">
-              <a:solidFill>
-                <a:schemeClr val="accent1">
-                  <a:lumMod val="75000"/>
-                </a:schemeClr>
-              </a:solidFill>
-            </a:endParaRPr>
-          </a:p>
-        </p:txBody>
-      </p:sp>
-      <p:sp>
-        <p:nvSpPr>
           <p:cNvPr id="25" name="Segnaposto data 24">
             <a:extLst>
               <a:ext uri="{FF2B5EF4-FFF2-40B4-BE49-F238E27FC236}">
@@ -18398,10 +21211,10 @@
                 <a:latin typeface="Poppins Medium" panose="00000600000000000000" pitchFamily="2" charset="0"/>
                 <a:cs typeface="Poppins Medium" panose="00000600000000000000" pitchFamily="2" charset="0"/>
               </a:rPr>
-              <a:t>3</a:t>
+              <a:t>33</a:t>
             </a:fld>
             <a:r>
-              <a:rPr lang="de-DE" sz="1600">
+              <a:rPr lang="de-DE" sz="1600" dirty="0">
                 <a:solidFill>
                   <a:schemeClr val="tx1"/>
                 </a:solidFill>
@@ -18413,48 +21226,12 @@
           </a:p>
         </p:txBody>
       </p:sp>
-      <p:pic>
-        <p:nvPicPr>
-          <p:cNvPr id="9" name="Immagine 8" descr="Immagine che contiene testo&#10;&#10;Descrizione generata automaticamente">
-            <a:extLst>
-              <a:ext uri="{FF2B5EF4-FFF2-40B4-BE49-F238E27FC236}">
-                <a16:creationId xmlns:a16="http://schemas.microsoft.com/office/drawing/2014/main" id="{F95EC3CA-A266-0594-7DBD-E728DB78F0E8}"/>
-              </a:ext>
-            </a:extLst>
-          </p:cNvPr>
-          <p:cNvPicPr>
-            <a:picLocks noChangeAspect="1"/>
-          </p:cNvPicPr>
-          <p:nvPr/>
-        </p:nvPicPr>
-        <p:blipFill>
-          <a:blip r:embed="rId4">
-            <a:extLst>
-              <a:ext uri="{28A0092B-C50C-407E-A947-70E740481C1C}">
-                <a14:useLocalDpi xmlns:a14="http://schemas.microsoft.com/office/drawing/2010/main" val="0"/>
-              </a:ext>
-            </a:extLst>
-          </a:blip>
-          <a:stretch>
-            <a:fillRect/>
-          </a:stretch>
-        </p:blipFill>
-        <p:spPr>
-          <a:xfrm>
-            <a:off x="838200" y="2903620"/>
-            <a:ext cx="7292926" cy="3247695"/>
-          </a:xfrm>
-          <a:prstGeom prst="rect">
-            <a:avLst/>
-          </a:prstGeom>
-        </p:spPr>
-      </p:pic>
-      <p:sp>
-        <p:nvSpPr>
-          <p:cNvPr id="24" name="Rettangolo 23">
-            <a:extLst>
-              <a:ext uri="{FF2B5EF4-FFF2-40B4-BE49-F238E27FC236}">
-                <a16:creationId xmlns:a16="http://schemas.microsoft.com/office/drawing/2014/main" id="{71C5E46E-415B-CDB4-BE22-19B4CD41D603}"/>
+      <p:sp>
+        <p:nvSpPr>
+          <p:cNvPr id="12" name="Rettangolo 11">
+            <a:extLst>
+              <a:ext uri="{FF2B5EF4-FFF2-40B4-BE49-F238E27FC236}">
+                <a16:creationId xmlns:a16="http://schemas.microsoft.com/office/drawing/2014/main" id="{F0FAD030-2623-A89C-4FA1-55CE81C0AE08}"/>
               </a:ext>
             </a:extLst>
           </p:cNvPr>
@@ -18503,10 +21280,10 @@
       </p:sp>
       <p:sp>
         <p:nvSpPr>
-          <p:cNvPr id="28" name="Titolo 1">
-            <a:extLst>
-              <a:ext uri="{FF2B5EF4-FFF2-40B4-BE49-F238E27FC236}">
-                <a16:creationId xmlns:a16="http://schemas.microsoft.com/office/drawing/2014/main" id="{B5D7AE2C-90E2-7B91-00EC-386C77D3753C}"/>
+          <p:cNvPr id="13" name="Titolo 1">
+            <a:extLst>
+              <a:ext uri="{FF2B5EF4-FFF2-40B4-BE49-F238E27FC236}">
+                <a16:creationId xmlns:a16="http://schemas.microsoft.com/office/drawing/2014/main" id="{A0F14F07-00BE-A130-44A5-463A5F98673C}"/>
               </a:ext>
             </a:extLst>
           </p:cNvPr>
@@ -18534,56 +21311,393 @@
                 <a:solidFill>
                   <a:schemeClr val="bg1"/>
                 </a:solidFill>
-                <a:effectLst>
-                  <a:outerShdw blurRad="38100" dist="38100" dir="2700000" algn="tl">
-                    <a:srgbClr val="000000">
-                      <a:alpha val="43137"/>
-                    </a:srgbClr>
-                  </a:outerShdw>
-                </a:effectLst>
                 <a:latin typeface="Poppins"/>
                 <a:cs typeface="Poppins"/>
               </a:rPr>
-              <a:t>Apertura </a:t>
-            </a:r>
-            <a:r>
-              <a:rPr lang="it-IT" sz="4000" b="1" dirty="0" err="1">
-                <a:solidFill>
-                  <a:schemeClr val="bg1"/>
-                </a:solidFill>
-                <a:effectLst>
-                  <a:outerShdw blurRad="38100" dist="38100" dir="2700000" algn="tl">
-                    <a:srgbClr val="000000">
-                      <a:alpha val="43137"/>
-                    </a:srgbClr>
-                  </a:outerShdw>
-                </a:effectLst>
-                <a:latin typeface="Poppins"/>
-                <a:cs typeface="Poppins"/>
-              </a:rPr>
-              <a:t>issues</a:t>
-            </a:r>
-            <a:endParaRPr lang="it-IT" sz="4000" b="1" dirty="0">
+              <a:t>CM-Strumento utilizzato</a:t>
+            </a:r>
+          </a:p>
+        </p:txBody>
+      </p:sp>
+      <p:sp>
+        <p:nvSpPr>
+          <p:cNvPr id="8" name="Segnaposto contenuto 6">
+            <a:extLst>
+              <a:ext uri="{FF2B5EF4-FFF2-40B4-BE49-F238E27FC236}">
+                <a16:creationId xmlns:a16="http://schemas.microsoft.com/office/drawing/2014/main" id="{F832EED3-9182-E3BD-D2D5-1723AFD8A0BD}"/>
+              </a:ext>
+            </a:extLst>
+          </p:cNvPr>
+          <p:cNvSpPr txBox="1">
+            <a:spLocks/>
+          </p:cNvSpPr>
+          <p:nvPr/>
+        </p:nvSpPr>
+        <p:spPr>
+          <a:xfrm>
+            <a:off x="834656" y="2005012"/>
+            <a:ext cx="10515600" cy="4351338"/>
+          </a:xfrm>
+          <a:prstGeom prst="rect">
+            <a:avLst/>
+          </a:prstGeom>
+        </p:spPr>
+        <p:txBody>
+          <a:bodyPr vert="horz" lIns="91440" tIns="45720" rIns="91440" bIns="45720" rtlCol="0">
+            <a:normAutofit/>
+          </a:bodyPr>
+          <a:lstStyle>
+            <a:lvl1pPr marL="228600" indent="-228600" algn="l" defTabSz="914400" rtl="0" eaLnBrk="1" latinLnBrk="0" hangingPunct="1">
+              <a:lnSpc>
+                <a:spcPct val="90000"/>
+              </a:lnSpc>
+              <a:spcBef>
+                <a:spcPts val="1000"/>
+              </a:spcBef>
+              <a:buFont typeface="Arial" panose="020B0604020202020204" pitchFamily="34" charset="0"/>
+              <a:buChar char="•"/>
+              <a:defRPr sz="2800" kern="1200">
+                <a:solidFill>
+                  <a:schemeClr val="tx1"/>
+                </a:solidFill>
+                <a:latin typeface="+mn-lt"/>
+                <a:ea typeface="+mn-ea"/>
+                <a:cs typeface="+mn-cs"/>
+              </a:defRPr>
+            </a:lvl1pPr>
+            <a:lvl2pPr marL="685800" indent="-228600" algn="l" defTabSz="914400" rtl="0" eaLnBrk="1" latinLnBrk="0" hangingPunct="1">
+              <a:lnSpc>
+                <a:spcPct val="90000"/>
+              </a:lnSpc>
+              <a:spcBef>
+                <a:spcPts val="500"/>
+              </a:spcBef>
+              <a:buFont typeface="Arial" panose="020B0604020202020204" pitchFamily="34" charset="0"/>
+              <a:buChar char="•"/>
+              <a:defRPr sz="2400" kern="1200">
+                <a:solidFill>
+                  <a:schemeClr val="tx1"/>
+                </a:solidFill>
+                <a:latin typeface="+mn-lt"/>
+                <a:ea typeface="+mn-ea"/>
+                <a:cs typeface="+mn-cs"/>
+              </a:defRPr>
+            </a:lvl2pPr>
+            <a:lvl3pPr marL="1143000" indent="-228600" algn="l" defTabSz="914400" rtl="0" eaLnBrk="1" latinLnBrk="0" hangingPunct="1">
+              <a:lnSpc>
+                <a:spcPct val="90000"/>
+              </a:lnSpc>
+              <a:spcBef>
+                <a:spcPts val="500"/>
+              </a:spcBef>
+              <a:buFont typeface="Arial" panose="020B0604020202020204" pitchFamily="34" charset="0"/>
+              <a:buChar char="•"/>
+              <a:defRPr sz="2000" kern="1200">
+                <a:solidFill>
+                  <a:schemeClr val="tx1"/>
+                </a:solidFill>
+                <a:latin typeface="+mn-lt"/>
+                <a:ea typeface="+mn-ea"/>
+                <a:cs typeface="+mn-cs"/>
+              </a:defRPr>
+            </a:lvl3pPr>
+            <a:lvl4pPr marL="1600200" indent="-228600" algn="l" defTabSz="914400" rtl="0" eaLnBrk="1" latinLnBrk="0" hangingPunct="1">
+              <a:lnSpc>
+                <a:spcPct val="90000"/>
+              </a:lnSpc>
+              <a:spcBef>
+                <a:spcPts val="500"/>
+              </a:spcBef>
+              <a:buFont typeface="Arial" panose="020B0604020202020204" pitchFamily="34" charset="0"/>
+              <a:buChar char="•"/>
+              <a:defRPr sz="1800" kern="1200">
+                <a:solidFill>
+                  <a:schemeClr val="tx1"/>
+                </a:solidFill>
+                <a:latin typeface="+mn-lt"/>
+                <a:ea typeface="+mn-ea"/>
+                <a:cs typeface="+mn-cs"/>
+              </a:defRPr>
+            </a:lvl4pPr>
+            <a:lvl5pPr marL="2057400" indent="-228600" algn="l" defTabSz="914400" rtl="0" eaLnBrk="1" latinLnBrk="0" hangingPunct="1">
+              <a:lnSpc>
+                <a:spcPct val="90000"/>
+              </a:lnSpc>
+              <a:spcBef>
+                <a:spcPts val="500"/>
+              </a:spcBef>
+              <a:buFont typeface="Arial" panose="020B0604020202020204" pitchFamily="34" charset="0"/>
+              <a:buChar char="•"/>
+              <a:defRPr sz="1800" kern="1200">
+                <a:solidFill>
+                  <a:schemeClr val="tx1"/>
+                </a:solidFill>
+                <a:latin typeface="+mn-lt"/>
+                <a:ea typeface="+mn-ea"/>
+                <a:cs typeface="+mn-cs"/>
+              </a:defRPr>
+            </a:lvl5pPr>
+            <a:lvl6pPr marL="2514600" indent="-228600" algn="l" defTabSz="914400" rtl="0" eaLnBrk="1" latinLnBrk="0" hangingPunct="1">
+              <a:lnSpc>
+                <a:spcPct val="90000"/>
+              </a:lnSpc>
+              <a:spcBef>
+                <a:spcPts val="500"/>
+              </a:spcBef>
+              <a:buFont typeface="Arial" panose="020B0604020202020204" pitchFamily="34" charset="0"/>
+              <a:buChar char="•"/>
+              <a:defRPr sz="1800" kern="1200">
+                <a:solidFill>
+                  <a:schemeClr val="tx1"/>
+                </a:solidFill>
+                <a:latin typeface="+mn-lt"/>
+                <a:ea typeface="+mn-ea"/>
+                <a:cs typeface="+mn-cs"/>
+              </a:defRPr>
+            </a:lvl6pPr>
+            <a:lvl7pPr marL="2971800" indent="-228600" algn="l" defTabSz="914400" rtl="0" eaLnBrk="1" latinLnBrk="0" hangingPunct="1">
+              <a:lnSpc>
+                <a:spcPct val="90000"/>
+              </a:lnSpc>
+              <a:spcBef>
+                <a:spcPts val="500"/>
+              </a:spcBef>
+              <a:buFont typeface="Arial" panose="020B0604020202020204" pitchFamily="34" charset="0"/>
+              <a:buChar char="•"/>
+              <a:defRPr sz="1800" kern="1200">
+                <a:solidFill>
+                  <a:schemeClr val="tx1"/>
+                </a:solidFill>
+                <a:latin typeface="+mn-lt"/>
+                <a:ea typeface="+mn-ea"/>
+                <a:cs typeface="+mn-cs"/>
+              </a:defRPr>
+            </a:lvl7pPr>
+            <a:lvl8pPr marL="3429000" indent="-228600" algn="l" defTabSz="914400" rtl="0" eaLnBrk="1" latinLnBrk="0" hangingPunct="1">
+              <a:lnSpc>
+                <a:spcPct val="90000"/>
+              </a:lnSpc>
+              <a:spcBef>
+                <a:spcPts val="500"/>
+              </a:spcBef>
+              <a:buFont typeface="Arial" panose="020B0604020202020204" pitchFamily="34" charset="0"/>
+              <a:buChar char="•"/>
+              <a:defRPr sz="1800" kern="1200">
+                <a:solidFill>
+                  <a:schemeClr val="tx1"/>
+                </a:solidFill>
+                <a:latin typeface="+mn-lt"/>
+                <a:ea typeface="+mn-ea"/>
+                <a:cs typeface="+mn-cs"/>
+              </a:defRPr>
+            </a:lvl8pPr>
+            <a:lvl9pPr marL="3886200" indent="-228600" algn="l" defTabSz="914400" rtl="0" eaLnBrk="1" latinLnBrk="0" hangingPunct="1">
+              <a:lnSpc>
+                <a:spcPct val="90000"/>
+              </a:lnSpc>
+              <a:spcBef>
+                <a:spcPts val="500"/>
+              </a:spcBef>
+              <a:buFont typeface="Arial" panose="020B0604020202020204" pitchFamily="34" charset="0"/>
+              <a:buChar char="•"/>
+              <a:defRPr sz="1800" kern="1200">
+                <a:solidFill>
+                  <a:schemeClr val="tx1"/>
+                </a:solidFill>
+                <a:latin typeface="+mn-lt"/>
+                <a:ea typeface="+mn-ea"/>
+                <a:cs typeface="+mn-cs"/>
+              </a:defRPr>
+            </a:lvl9pPr>
+          </a:lstStyle>
+          <a:p>
+            <a:pPr marL="0" indent="0">
+              <a:buFont typeface="Arial" panose="020B0604020202020204" pitchFamily="34" charset="0"/>
+              <a:buNone/>
+            </a:pPr>
+            <a:endParaRPr lang="it-IT" sz="2400" dirty="0">
+              <a:latin typeface="Poppins Medium" panose="00000600000000000000" pitchFamily="2" charset="0"/>
+              <a:cs typeface="Poppins Medium" panose="00000600000000000000" pitchFamily="2" charset="0"/>
+            </a:endParaRPr>
+          </a:p>
+          <a:p>
+            <a:pPr marL="0" indent="0">
+              <a:buFont typeface="Arial" panose="020B0604020202020204" pitchFamily="34" charset="0"/>
+              <a:buNone/>
+            </a:pPr>
+            <a:endParaRPr lang="it-IT" sz="2400" dirty="0">
+              <a:latin typeface="Poppins Medium" panose="00000600000000000000" pitchFamily="2" charset="0"/>
+              <a:cs typeface="Poppins Medium" panose="00000600000000000000" pitchFamily="2" charset="0"/>
+            </a:endParaRPr>
+          </a:p>
+          <a:p>
+            <a:pPr marL="0" indent="0">
+              <a:buFont typeface="Arial" panose="020B0604020202020204" pitchFamily="34" charset="0"/>
+              <a:buNone/>
+            </a:pPr>
+            <a:endParaRPr lang="it-IT" sz="2400" dirty="0">
+              <a:latin typeface="Poppins Medium" panose="00000600000000000000" pitchFamily="2" charset="0"/>
+              <a:cs typeface="Poppins Medium" panose="00000600000000000000" pitchFamily="2" charset="0"/>
+            </a:endParaRPr>
+          </a:p>
+          <a:p>
+            <a:pPr marL="0" indent="0">
+              <a:buFont typeface="Arial" panose="020B0604020202020204" pitchFamily="34" charset="0"/>
+              <a:buNone/>
+            </a:pPr>
+            <a:endParaRPr lang="it-IT" dirty="0">
               <a:solidFill>
-                <a:schemeClr val="bg1"/>
+                <a:schemeClr val="accent1">
+                  <a:lumMod val="75000"/>
+                </a:schemeClr>
               </a:solidFill>
-              <a:effectLst>
-                <a:outerShdw blurRad="38100" dist="38100" dir="2700000" algn="tl">
-                  <a:srgbClr val="000000">
-                    <a:alpha val="43137"/>
-                  </a:srgbClr>
-                </a:outerShdw>
-              </a:effectLst>
-              <a:latin typeface="Poppins"/>
-              <a:cs typeface="Poppins"/>
             </a:endParaRPr>
           </a:p>
         </p:txBody>
       </p:sp>
+      <p:sp>
+        <p:nvSpPr>
+          <p:cNvPr id="10" name="CasellaDiTesto 9">
+            <a:extLst>
+              <a:ext uri="{FF2B5EF4-FFF2-40B4-BE49-F238E27FC236}">
+                <a16:creationId xmlns:a16="http://schemas.microsoft.com/office/drawing/2014/main" id="{A7CDDB9E-ADE5-C99D-F37A-B5643C4976DA}"/>
+              </a:ext>
+            </a:extLst>
+          </p:cNvPr>
+          <p:cNvSpPr txBox="1"/>
+          <p:nvPr/>
+        </p:nvSpPr>
+        <p:spPr>
+          <a:xfrm>
+            <a:off x="663443" y="2235701"/>
+            <a:ext cx="6784400" cy="2677656"/>
+          </a:xfrm>
+          <a:prstGeom prst="rect">
+            <a:avLst/>
+          </a:prstGeom>
+          <a:noFill/>
+        </p:spPr>
+        <p:txBody>
+          <a:bodyPr wrap="square" rtlCol="0">
+            <a:spAutoFit/>
+          </a:bodyPr>
+          <a:lstStyle/>
+          <a:p>
+            <a:r>
+              <a:rPr lang="it-IT" sz="2800" dirty="0">
+                <a:latin typeface="Poppins Medium" panose="00000600000000000000" pitchFamily="2" charset="0"/>
+                <a:cs typeface="Poppins Medium" panose="00000600000000000000" pitchFamily="2" charset="0"/>
+              </a:rPr>
+              <a:t>Un </a:t>
+            </a:r>
+            <a:r>
+              <a:rPr lang="it-IT" sz="2800" dirty="0" err="1">
+                <a:latin typeface="Poppins Medium" panose="00000600000000000000" pitchFamily="2" charset="0"/>
+                <a:cs typeface="Poppins Medium" panose="00000600000000000000" pitchFamily="2" charset="0"/>
+              </a:rPr>
+              <a:t>Configuration</a:t>
+            </a:r>
+            <a:r>
+              <a:rPr lang="it-IT" sz="2800" dirty="0">
+                <a:latin typeface="Poppins Medium" panose="00000600000000000000" pitchFamily="2" charset="0"/>
+                <a:cs typeface="Poppins Medium" panose="00000600000000000000" pitchFamily="2" charset="0"/>
+              </a:rPr>
+              <a:t> Management Tool che potrebbe essere applicato a questo progetto è Docker (</a:t>
+            </a:r>
+            <a:r>
+              <a:rPr lang="it-IT" sz="2800" u="sng" dirty="0">
+                <a:solidFill>
+                  <a:schemeClr val="accent1">
+                    <a:lumMod val="50000"/>
+                  </a:schemeClr>
+                </a:solidFill>
+                <a:latin typeface="Poppins Medium" panose="00000600000000000000" pitchFamily="2" charset="0"/>
+                <a:cs typeface="Poppins Medium" panose="00000600000000000000" pitchFamily="2" charset="0"/>
+                <a:hlinkClick r:id="rId3"/>
+              </a:rPr>
+              <a:t>www.docker.com</a:t>
+            </a:r>
+            <a:r>
+              <a:rPr lang="it-IT" sz="2800" dirty="0">
+                <a:latin typeface="Poppins Medium" panose="00000600000000000000" pitchFamily="2" charset="0"/>
+                <a:cs typeface="Poppins Medium" panose="00000600000000000000" pitchFamily="2" charset="0"/>
+              </a:rPr>
+              <a:t>).</a:t>
+            </a:r>
+          </a:p>
+          <a:p>
+            <a:pPr marL="457200" indent="-457200">
+              <a:buFont typeface="Arial" panose="020B0604020202020204" pitchFamily="34" charset="0"/>
+              <a:buChar char="•"/>
+            </a:pPr>
+            <a:r>
+              <a:rPr lang="it-IT" sz="2800" dirty="0" err="1">
+                <a:latin typeface="Poppins Medium" panose="00000600000000000000" pitchFamily="2" charset="0"/>
+                <a:cs typeface="Poppins Medium" panose="00000600000000000000" pitchFamily="2" charset="0"/>
+              </a:rPr>
+              <a:t>Infrastracture</a:t>
+            </a:r>
+            <a:r>
+              <a:rPr lang="it-IT" sz="2800" dirty="0">
+                <a:latin typeface="Poppins Medium" panose="00000600000000000000" pitchFamily="2" charset="0"/>
+                <a:cs typeface="Poppins Medium" panose="00000600000000000000" pitchFamily="2" charset="0"/>
+              </a:rPr>
+              <a:t> Update Pattern: IMMUTABLE</a:t>
+            </a:r>
+          </a:p>
+        </p:txBody>
+      </p:sp>
+      <p:pic>
+        <p:nvPicPr>
+          <p:cNvPr id="4098" name="Picture 2" descr="Docker: container per tutte le esigenze ‣ Seeweb">
+            <a:extLst>
+              <a:ext uri="{FF2B5EF4-FFF2-40B4-BE49-F238E27FC236}">
+                <a16:creationId xmlns:a16="http://schemas.microsoft.com/office/drawing/2014/main" id="{401A989B-03EA-2B8F-B893-66BC15ED827A}"/>
+              </a:ext>
+            </a:extLst>
+          </p:cNvPr>
+          <p:cNvPicPr>
+            <a:picLocks noChangeAspect="1" noChangeArrowheads="1"/>
+          </p:cNvPicPr>
+          <p:nvPr/>
+        </p:nvPicPr>
+        <p:blipFill>
+          <a:blip r:embed="rId4">
+            <a:extLst>
+              <a:ext uri="{28A0092B-C50C-407E-A947-70E740481C1C}">
+                <a14:useLocalDpi xmlns:a14="http://schemas.microsoft.com/office/drawing/2010/main" val="0"/>
+              </a:ext>
+            </a:extLst>
+          </a:blip>
+          <a:srcRect/>
+          <a:stretch>
+            <a:fillRect/>
+          </a:stretch>
+        </p:blipFill>
+        <p:spPr bwMode="auto">
+          <a:xfrm>
+            <a:off x="7921407" y="2028328"/>
+            <a:ext cx="3737043" cy="3092403"/>
+          </a:xfrm>
+          <a:prstGeom prst="rect">
+            <a:avLst/>
+          </a:prstGeom>
+          <a:noFill/>
+          <a:extLst>
+            <a:ext uri="{909E8E84-426E-40DD-AFC4-6F175D3DCCD1}">
+              <a14:hiddenFill xmlns:a14="http://schemas.microsoft.com/office/drawing/2010/main">
+                <a:solidFill>
+                  <a:srgbClr val="FFFFFF"/>
+                </a:solidFill>
+              </a14:hiddenFill>
+            </a:ext>
+          </a:extLst>
+        </p:spPr>
+      </p:pic>
     </p:spTree>
     <p:extLst>
       <p:ext uri="{BB962C8B-B14F-4D97-AF65-F5344CB8AC3E}">
-        <p14:creationId xmlns:p14="http://schemas.microsoft.com/office/powerpoint/2010/main" val="4282466121"/>
+        <p14:creationId xmlns:p14="http://schemas.microsoft.com/office/powerpoint/2010/main" val="3865867687"/>
       </p:ext>
     </p:extLst>
   </p:cSld>
@@ -18593,7 +21707,7 @@
 </p:sld>
 </file>
 
-<file path=ppt/slides/slide30.xml><?xml version="1.0" encoding="utf-8"?>
+<file path=ppt/slides/slide34.xml><?xml version="1.0" encoding="utf-8"?>
 <p:sld xmlns:a="http://schemas.openxmlformats.org/drawingml/2006/main" xmlns:r="http://schemas.openxmlformats.org/officeDocument/2006/relationships" xmlns:p="http://schemas.openxmlformats.org/presentationml/2006/main">
   <p:cSld>
     <p:spTree>
@@ -18847,7 +21961,7 @@
                 <a:cs typeface="Poppins Medium" panose="00000600000000000000" pitchFamily="2" charset="0"/>
               </a:rPr>
               <a:pPr/>
-              <a:t>30</a:t>
+              <a:t>34</a:t>
             </a:fld>
             <a:r>
               <a:rPr lang="de-DE" sz="1600">

</xml_diff>